<commit_message>
add more informatiton to the power point
</commit_message>
<xml_diff>
--- a/CyberBullying.pptx
+++ b/CyberBullying.pptx
@@ -5,7 +5,7 @@
     <p:sldMasterId id="2147483704" r:id="rId1"/>
   </p:sldMasterIdLst>
   <p:notesMasterIdLst>
-    <p:notesMasterId r:id="rId10"/>
+    <p:notesMasterId r:id="rId16"/>
   </p:notesMasterIdLst>
   <p:sldIdLst>
     <p:sldId id="256" r:id="rId2"/>
@@ -14,8 +14,14 @@
     <p:sldId id="259" r:id="rId5"/>
     <p:sldId id="260" r:id="rId6"/>
     <p:sldId id="261" r:id="rId7"/>
-    <p:sldId id="262" r:id="rId8"/>
-    <p:sldId id="263" r:id="rId9"/>
+    <p:sldId id="264" r:id="rId8"/>
+    <p:sldId id="262" r:id="rId9"/>
+    <p:sldId id="263" r:id="rId10"/>
+    <p:sldId id="265" r:id="rId11"/>
+    <p:sldId id="266" r:id="rId12"/>
+    <p:sldId id="267" r:id="rId13"/>
+    <p:sldId id="269" r:id="rId14"/>
+    <p:sldId id="268" r:id="rId15"/>
   </p:sldIdLst>
   <p:sldSz cx="12192000" cy="6858000"/>
   <p:notesSz cx="6858000" cy="9144000"/>
@@ -1280,7 +1286,7 @@
           <a:pPr rtl="0"/>
           <a:r>
             <a:rPr lang="en-US" dirty="0"/>
-            <a:t>Slang, spelling mistake, multiple letters</a:t>
+            <a:t>Slang, spelling mistake, duplicate  characters</a:t>
           </a:r>
           <a:endParaRPr lang="he-IL" dirty="0"/>
         </a:p>
@@ -1364,7 +1370,7 @@
       <dgm:spPr/>
     </dgm:pt>
     <dgm:pt modelId="{132AA173-2FED-4A80-B73A-C6A1B1F0A280}" type="pres">
-      <dgm:prSet presAssocID="{7E8D4FCE-FC3C-47DB-AE58-007D58E694AF}" presName="box" presStyleLbl="node1" presStyleIdx="0" presStyleCnt="4" custLinFactNeighborX="210"/>
+      <dgm:prSet presAssocID="{7E8D4FCE-FC3C-47DB-AE58-007D58E694AF}" presName="box" presStyleLbl="node1" presStyleIdx="0" presStyleCnt="4" custLinFactNeighborX="-210"/>
       <dgm:spPr/>
     </dgm:pt>
     <dgm:pt modelId="{751D7CE3-53F0-48E8-AB9E-5663DB1E8BFC}" type="pres">
@@ -2157,7 +2163,7 @@
           </a:pPr>
           <a:r>
             <a:rPr lang="en-US" sz="1800" kern="1200" dirty="0"/>
-            <a:t>Slang, spelling mistake, multiple letters</a:t>
+            <a:t>Slang, spelling mistake, duplicate  characters</a:t>
           </a:r>
           <a:endParaRPr lang="he-IL" sz="1800" kern="1200" dirty="0"/>
         </a:p>
@@ -3644,7 +3650,7 @@
           <a:p>
             <a:fld id="{CDFA15A2-2820-48F7-A476-00783D0B9E42}" type="datetimeFigureOut">
               <a:rPr lang="he-IL" smtClean="0"/>
-              <a:t>כ"א/סיון/תש"פ</a:t>
+              <a:t>כ"ה/סיון/תש"פ</a:t>
             </a:fld>
             <a:endParaRPr lang="he-IL"/>
           </a:p>
@@ -4234,7 +4240,7 @@
           <a:p>
             <a:fld id="{476A9585-3896-4CC5-B07B-12C1E5AFAA07}" type="slidenum">
               <a:rPr lang="he-IL" smtClean="0"/>
-              <a:t>7</a:t>
+              <a:t>8</a:t>
             </a:fld>
             <a:endParaRPr lang="he-IL"/>
           </a:p>
@@ -4244,6 +4250,90 @@
     <p:extLst>
       <p:ext uri="{BB962C8B-B14F-4D97-AF65-F5344CB8AC3E}">
         <p14:creationId xmlns:p14="http://schemas.microsoft.com/office/powerpoint/2010/main" val="2641001258"/>
+      </p:ext>
+    </p:extLst>
+  </p:cSld>
+  <p:clrMapOvr>
+    <a:masterClrMapping/>
+  </p:clrMapOvr>
+</p:notes>
+</file>
+
+<file path=ppt/notesSlides/notesSlide4.xml><?xml version="1.0" encoding="utf-8"?>
+<p:notes xmlns:a="http://schemas.openxmlformats.org/drawingml/2006/main" xmlns:r="http://schemas.openxmlformats.org/officeDocument/2006/relationships" xmlns:p="http://schemas.openxmlformats.org/presentationml/2006/main">
+  <p:cSld>
+    <p:spTree>
+      <p:nvGrpSpPr>
+        <p:cNvPr id="1" name=""/>
+        <p:cNvGrpSpPr/>
+        <p:nvPr/>
+      </p:nvGrpSpPr>
+      <p:grpSpPr>
+        <a:xfrm>
+          <a:off x="0" y="0"/>
+          <a:ext cx="0" cy="0"/>
+          <a:chOff x="0" y="0"/>
+          <a:chExt cx="0" cy="0"/>
+        </a:xfrm>
+      </p:grpSpPr>
+      <p:sp>
+        <p:nvSpPr>
+          <p:cNvPr id="2" name="מציין מיקום של תמונת שקופית 1"/>
+          <p:cNvSpPr>
+            <a:spLocks noGrp="1" noRot="1" noChangeAspect="1"/>
+          </p:cNvSpPr>
+          <p:nvPr>
+            <p:ph type="sldImg"/>
+          </p:nvPr>
+        </p:nvSpPr>
+        <p:spPr/>
+      </p:sp>
+      <p:sp>
+        <p:nvSpPr>
+          <p:cNvPr id="3" name="מציין מיקום של הערות 2"/>
+          <p:cNvSpPr>
+            <a:spLocks noGrp="1"/>
+          </p:cNvSpPr>
+          <p:nvPr>
+            <p:ph type="body" idx="1"/>
+          </p:nvPr>
+        </p:nvSpPr>
+        <p:spPr/>
+        <p:txBody>
+          <a:bodyPr/>
+          <a:lstStyle/>
+          <a:p>
+            <a:endParaRPr lang="he-IL" dirty="0"/>
+          </a:p>
+        </p:txBody>
+      </p:sp>
+      <p:sp>
+        <p:nvSpPr>
+          <p:cNvPr id="4" name="מציין מיקום של מספר שקופית 3"/>
+          <p:cNvSpPr>
+            <a:spLocks noGrp="1"/>
+          </p:cNvSpPr>
+          <p:nvPr>
+            <p:ph type="sldNum" sz="quarter" idx="5"/>
+          </p:nvPr>
+        </p:nvSpPr>
+        <p:spPr/>
+        <p:txBody>
+          <a:bodyPr/>
+          <a:lstStyle/>
+          <a:p>
+            <a:fld id="{476A9585-3896-4CC5-B07B-12C1E5AFAA07}" type="slidenum">
+              <a:rPr lang="he-IL" smtClean="0"/>
+              <a:t>10</a:t>
+            </a:fld>
+            <a:endParaRPr lang="he-IL"/>
+          </a:p>
+        </p:txBody>
+      </p:sp>
+    </p:spTree>
+    <p:extLst>
+      <p:ext uri="{BB962C8B-B14F-4D97-AF65-F5344CB8AC3E}">
+        <p14:creationId xmlns:p14="http://schemas.microsoft.com/office/powerpoint/2010/main" val="2310891190"/>
       </p:ext>
     </p:extLst>
   </p:cSld>
@@ -4756,7 +4846,7 @@
             <a:fld id="{B61BEF0D-F0BB-DE4B-95CE-6DB70DBA9567}" type="datetimeFigureOut">
               <a:rPr lang="en-US" smtClean="0"/>
               <a:pPr/>
-              <a:t>6/13/2020</a:t>
+              <a:t>6/17/2020</a:t>
             </a:fld>
             <a:endParaRPr lang="en-US" dirty="0"/>
           </a:p>
@@ -5054,7 +5144,7 @@
             <a:fld id="{B61BEF0D-F0BB-DE4B-95CE-6DB70DBA9567}" type="datetimeFigureOut">
               <a:rPr lang="en-US" smtClean="0"/>
               <a:pPr/>
-              <a:t>6/13/2020</a:t>
+              <a:t>6/17/2020</a:t>
             </a:fld>
             <a:endParaRPr lang="en-US" dirty="0"/>
           </a:p>
@@ -5304,7 +5394,7 @@
             <a:fld id="{B61BEF0D-F0BB-DE4B-95CE-6DB70DBA9567}" type="datetimeFigureOut">
               <a:rPr lang="en-US" smtClean="0"/>
               <a:pPr/>
-              <a:t>6/13/2020</a:t>
+              <a:t>6/17/2020</a:t>
             </a:fld>
             <a:endParaRPr lang="en-US" dirty="0"/>
           </a:p>
@@ -5846,7 +5936,7 @@
             <a:fld id="{B61BEF0D-F0BB-DE4B-95CE-6DB70DBA9567}" type="datetimeFigureOut">
               <a:rPr lang="en-US" smtClean="0"/>
               <a:pPr/>
-              <a:t>6/13/2020</a:t>
+              <a:t>6/17/2020</a:t>
             </a:fld>
             <a:endParaRPr lang="en-US" dirty="0"/>
           </a:p>
@@ -6096,7 +6186,7 @@
             <a:fld id="{B61BEF0D-F0BB-DE4B-95CE-6DB70DBA9567}" type="datetimeFigureOut">
               <a:rPr lang="en-US" smtClean="0"/>
               <a:pPr/>
-              <a:t>6/13/2020</a:t>
+              <a:t>6/17/2020</a:t>
             </a:fld>
             <a:endParaRPr lang="en-US" dirty="0"/>
           </a:p>
@@ -6630,7 +6720,7 @@
             <a:fld id="{B61BEF0D-F0BB-DE4B-95CE-6DB70DBA9567}" type="datetimeFigureOut">
               <a:rPr lang="en-US" smtClean="0"/>
               <a:pPr/>
-              <a:t>6/13/2020</a:t>
+              <a:t>6/17/2020</a:t>
             </a:fld>
             <a:endParaRPr lang="en-US" dirty="0"/>
           </a:p>
@@ -6929,7 +7019,7 @@
             <a:fld id="{B61BEF0D-F0BB-DE4B-95CE-6DB70DBA9567}" type="datetimeFigureOut">
               <a:rPr lang="en-US" smtClean="0"/>
               <a:pPr/>
-              <a:t>6/13/2020</a:t>
+              <a:t>6/17/2020</a:t>
             </a:fld>
             <a:endParaRPr lang="en-US" dirty="0"/>
           </a:p>
@@ -7105,7 +7195,7 @@
             <a:fld id="{B61BEF0D-F0BB-DE4B-95CE-6DB70DBA9567}" type="datetimeFigureOut">
               <a:rPr lang="en-US" smtClean="0"/>
               <a:pPr/>
-              <a:t>6/13/2020</a:t>
+              <a:t>6/17/2020</a:t>
             </a:fld>
             <a:endParaRPr lang="en-US" dirty="0"/>
           </a:p>
@@ -7287,7 +7377,7 @@
             <a:fld id="{B61BEF0D-F0BB-DE4B-95CE-6DB70DBA9567}" type="datetimeFigureOut">
               <a:rPr lang="en-US" smtClean="0"/>
               <a:pPr/>
-              <a:t>6/13/2020</a:t>
+              <a:t>6/17/2020</a:t>
             </a:fld>
             <a:endParaRPr lang="en-US" dirty="0"/>
           </a:p>
@@ -7459,7 +7549,7 @@
             <a:fld id="{B61BEF0D-F0BB-DE4B-95CE-6DB70DBA9567}" type="datetimeFigureOut">
               <a:rPr lang="en-US" smtClean="0"/>
               <a:pPr/>
-              <a:t>6/13/2020</a:t>
+              <a:t>6/17/2020</a:t>
             </a:fld>
             <a:endParaRPr lang="en-US" dirty="0"/>
           </a:p>
@@ -7712,7 +7802,7 @@
             <a:fld id="{B61BEF0D-F0BB-DE4B-95CE-6DB70DBA9567}" type="datetimeFigureOut">
               <a:rPr lang="en-US" smtClean="0"/>
               <a:pPr/>
-              <a:t>6/13/2020</a:t>
+              <a:t>6/17/2020</a:t>
             </a:fld>
             <a:endParaRPr lang="en-US" dirty="0"/>
           </a:p>
@@ -8011,7 +8101,7 @@
             <a:fld id="{B61BEF0D-F0BB-DE4B-95CE-6DB70DBA9567}" type="datetimeFigureOut">
               <a:rPr lang="en-US" smtClean="0"/>
               <a:pPr/>
-              <a:t>6/13/2020</a:t>
+              <a:t>6/17/2020</a:t>
             </a:fld>
             <a:endParaRPr lang="en-US" dirty="0"/>
           </a:p>
@@ -8455,7 +8545,7 @@
             <a:fld id="{B61BEF0D-F0BB-DE4B-95CE-6DB70DBA9567}" type="datetimeFigureOut">
               <a:rPr lang="en-US" smtClean="0"/>
               <a:pPr/>
-              <a:t>6/13/2020</a:t>
+              <a:t>6/17/2020</a:t>
             </a:fld>
             <a:endParaRPr lang="en-US" dirty="0"/>
           </a:p>
@@ -8575,7 +8665,7 @@
             <a:fld id="{B61BEF0D-F0BB-DE4B-95CE-6DB70DBA9567}" type="datetimeFigureOut">
               <a:rPr lang="en-US" smtClean="0"/>
               <a:pPr/>
-              <a:t>6/13/2020</a:t>
+              <a:t>6/17/2020</a:t>
             </a:fld>
             <a:endParaRPr lang="en-US" dirty="0"/>
           </a:p>
@@ -8672,7 +8762,7 @@
             <a:fld id="{B61BEF0D-F0BB-DE4B-95CE-6DB70DBA9567}" type="datetimeFigureOut">
               <a:rPr lang="en-US" smtClean="0"/>
               <a:pPr/>
-              <a:t>6/13/2020</a:t>
+              <a:t>6/17/2020</a:t>
             </a:fld>
             <a:endParaRPr lang="en-US" dirty="0"/>
           </a:p>
@@ -8957,7 +9047,7 @@
             <a:fld id="{B61BEF0D-F0BB-DE4B-95CE-6DB70DBA9567}" type="datetimeFigureOut">
               <a:rPr lang="en-US" smtClean="0"/>
               <a:pPr/>
-              <a:t>6/13/2020</a:t>
+              <a:t>6/17/2020</a:t>
             </a:fld>
             <a:endParaRPr lang="en-US" dirty="0"/>
           </a:p>
@@ -9250,7 +9340,7 @@
             <a:fld id="{B61BEF0D-F0BB-DE4B-95CE-6DB70DBA9567}" type="datetimeFigureOut">
               <a:rPr lang="en-US" smtClean="0"/>
               <a:pPr/>
-              <a:t>6/13/2020</a:t>
+              <a:t>6/17/2020</a:t>
             </a:fld>
             <a:endParaRPr lang="en-US" dirty="0"/>
           </a:p>
@@ -9782,7 +9872,7 @@
             <a:fld id="{B61BEF0D-F0BB-DE4B-95CE-6DB70DBA9567}" type="datetimeFigureOut">
               <a:rPr lang="en-US" smtClean="0"/>
               <a:pPr/>
-              <a:t>6/13/2020</a:t>
+              <a:t>6/17/2020</a:t>
             </a:fld>
             <a:endParaRPr lang="en-US" dirty="0"/>
           </a:p>
@@ -10430,6 +10520,780 @@
     <p:extLst>
       <p:ext uri="{BB962C8B-B14F-4D97-AF65-F5344CB8AC3E}">
         <p14:creationId xmlns:p14="http://schemas.microsoft.com/office/powerpoint/2010/main" val="63724359"/>
+      </p:ext>
+    </p:extLst>
+  </p:cSld>
+  <p:clrMapOvr>
+    <a:masterClrMapping/>
+  </p:clrMapOvr>
+</p:sld>
+</file>
+
+<file path=ppt/slides/slide10.xml><?xml version="1.0" encoding="utf-8"?>
+<p:sld xmlns:a="http://schemas.openxmlformats.org/drawingml/2006/main" xmlns:r="http://schemas.openxmlformats.org/officeDocument/2006/relationships" xmlns:p="http://schemas.openxmlformats.org/presentationml/2006/main">
+  <p:cSld>
+    <p:spTree>
+      <p:nvGrpSpPr>
+        <p:cNvPr id="1" name=""/>
+        <p:cNvGrpSpPr/>
+        <p:nvPr/>
+      </p:nvGrpSpPr>
+      <p:grpSpPr>
+        <a:xfrm>
+          <a:off x="0" y="0"/>
+          <a:ext cx="0" cy="0"/>
+          <a:chOff x="0" y="0"/>
+          <a:chExt cx="0" cy="0"/>
+        </a:xfrm>
+      </p:grpSpPr>
+      <p:sp>
+        <p:nvSpPr>
+          <p:cNvPr id="2" name="כותרת 1">
+            <a:extLst>
+              <a:ext uri="{FF2B5EF4-FFF2-40B4-BE49-F238E27FC236}">
+                <a16:creationId xmlns:a16="http://schemas.microsoft.com/office/drawing/2014/main" id="{824145C2-51AD-4E01-8632-1E21538C8013}"/>
+              </a:ext>
+            </a:extLst>
+          </p:cNvPr>
+          <p:cNvSpPr>
+            <a:spLocks noGrp="1"/>
+          </p:cNvSpPr>
+          <p:nvPr>
+            <p:ph type="title"/>
+          </p:nvPr>
+        </p:nvSpPr>
+        <p:spPr>
+          <a:xfrm>
+            <a:off x="2111837" y="-282390"/>
+            <a:ext cx="10018713" cy="1752599"/>
+          </a:xfrm>
+        </p:spPr>
+        <p:txBody>
+          <a:bodyPr/>
+          <a:lstStyle/>
+          <a:p>
+            <a:r>
+              <a:rPr lang="en-US" dirty="0"/>
+              <a:t>First Results</a:t>
+            </a:r>
+            <a:endParaRPr lang="he-IL" dirty="0"/>
+          </a:p>
+        </p:txBody>
+      </p:sp>
+      <p:sp>
+        <p:nvSpPr>
+          <p:cNvPr id="3" name="מציין מיקום תוכן 2">
+            <a:extLst>
+              <a:ext uri="{FF2B5EF4-FFF2-40B4-BE49-F238E27FC236}">
+                <a16:creationId xmlns:a16="http://schemas.microsoft.com/office/drawing/2014/main" id="{A9095A01-1214-453D-91E7-C482D21B67E3}"/>
+              </a:ext>
+            </a:extLst>
+          </p:cNvPr>
+          <p:cNvSpPr>
+            <a:spLocks noGrp="1"/>
+          </p:cNvSpPr>
+          <p:nvPr>
+            <p:ph idx="1"/>
+          </p:nvPr>
+        </p:nvSpPr>
+        <p:spPr/>
+        <p:txBody>
+          <a:bodyPr/>
+          <a:lstStyle/>
+          <a:p>
+            <a:endParaRPr lang="he-IL" dirty="0"/>
+          </a:p>
+        </p:txBody>
+      </p:sp>
+      <p:pic>
+        <p:nvPicPr>
+          <p:cNvPr id="4" name="תמונה 3">
+            <a:extLst>
+              <a:ext uri="{FF2B5EF4-FFF2-40B4-BE49-F238E27FC236}">
+                <a16:creationId xmlns:a16="http://schemas.microsoft.com/office/drawing/2014/main" id="{8669AE88-8A57-4EDE-B2E3-DDD62F6EA8D4}"/>
+              </a:ext>
+            </a:extLst>
+          </p:cNvPr>
+          <p:cNvPicPr>
+            <a:picLocks noChangeAspect="1"/>
+          </p:cNvPicPr>
+          <p:nvPr/>
+        </p:nvPicPr>
+        <p:blipFill>
+          <a:blip r:embed="rId3"/>
+          <a:stretch>
+            <a:fillRect/>
+          </a:stretch>
+        </p:blipFill>
+        <p:spPr>
+          <a:xfrm>
+            <a:off x="5127813" y="1685611"/>
+            <a:ext cx="6777318" cy="5086975"/>
+          </a:xfrm>
+          <a:prstGeom prst="rect">
+            <a:avLst/>
+          </a:prstGeom>
+          <a:ln>
+            <a:noFill/>
+          </a:ln>
+          <a:effectLst>
+            <a:outerShdw blurRad="190500" algn="tl" rotWithShape="0">
+              <a:srgbClr val="000000">
+                <a:alpha val="70000"/>
+              </a:srgbClr>
+            </a:outerShdw>
+          </a:effectLst>
+        </p:spPr>
+      </p:pic>
+      <p:pic>
+        <p:nvPicPr>
+          <p:cNvPr id="5" name="תמונה 4">
+            <a:extLst>
+              <a:ext uri="{FF2B5EF4-FFF2-40B4-BE49-F238E27FC236}">
+                <a16:creationId xmlns:a16="http://schemas.microsoft.com/office/drawing/2014/main" id="{7AAC26FB-2251-4962-ABEF-DAD49D2D7EF0}"/>
+              </a:ext>
+            </a:extLst>
+          </p:cNvPr>
+          <p:cNvPicPr>
+            <a:picLocks noChangeAspect="1"/>
+          </p:cNvPicPr>
+          <p:nvPr/>
+        </p:nvPicPr>
+        <p:blipFill rotWithShape="1">
+          <a:blip r:embed="rId4"/>
+          <a:srcRect l="6013" t="5841" r="54836" b="50000"/>
+          <a:stretch/>
+        </p:blipFill>
+        <p:spPr>
+          <a:xfrm>
+            <a:off x="688976" y="2684"/>
+            <a:ext cx="4313330" cy="3710732"/>
+          </a:xfrm>
+          <a:prstGeom prst="rect">
+            <a:avLst/>
+          </a:prstGeom>
+          <a:ln w="38100" cap="sq">
+            <a:solidFill>
+              <a:srgbClr val="000000"/>
+            </a:solidFill>
+            <a:prstDash val="solid"/>
+            <a:miter lim="800000"/>
+          </a:ln>
+          <a:effectLst>
+            <a:outerShdw blurRad="50800" dist="38100" dir="2700000" algn="tl" rotWithShape="0">
+              <a:srgbClr val="000000">
+                <a:alpha val="43000"/>
+              </a:srgbClr>
+            </a:outerShdw>
+          </a:effectLst>
+        </p:spPr>
+      </p:pic>
+      <p:cxnSp>
+        <p:nvCxnSpPr>
+          <p:cNvPr id="7" name="מחבר ישר 6">
+            <a:extLst>
+              <a:ext uri="{FF2B5EF4-FFF2-40B4-BE49-F238E27FC236}">
+                <a16:creationId xmlns:a16="http://schemas.microsoft.com/office/drawing/2014/main" id="{4167B542-7FF3-45FF-B688-C101C6707D4D}"/>
+              </a:ext>
+            </a:extLst>
+          </p:cNvPr>
+          <p:cNvCxnSpPr/>
+          <p:nvPr/>
+        </p:nvCxnSpPr>
+        <p:spPr>
+          <a:xfrm>
+            <a:off x="5002306" y="0"/>
+            <a:ext cx="1524000" cy="2026024"/>
+          </a:xfrm>
+          <a:prstGeom prst="line">
+            <a:avLst/>
+          </a:prstGeom>
+          <a:ln w="38100"/>
+        </p:spPr>
+        <p:style>
+          <a:lnRef idx="3">
+            <a:schemeClr val="dk1"/>
+          </a:lnRef>
+          <a:fillRef idx="0">
+            <a:schemeClr val="dk1"/>
+          </a:fillRef>
+          <a:effectRef idx="2">
+            <a:schemeClr val="dk1"/>
+          </a:effectRef>
+          <a:fontRef idx="minor">
+            <a:schemeClr val="tx1"/>
+          </a:fontRef>
+        </p:style>
+      </p:cxnSp>
+      <p:cxnSp>
+        <p:nvCxnSpPr>
+          <p:cNvPr id="9" name="מחבר ישר 8">
+            <a:extLst>
+              <a:ext uri="{FF2B5EF4-FFF2-40B4-BE49-F238E27FC236}">
+                <a16:creationId xmlns:a16="http://schemas.microsoft.com/office/drawing/2014/main" id="{F4171692-5D1D-44C8-9E84-E43E5A46C36B}"/>
+              </a:ext>
+            </a:extLst>
+          </p:cNvPr>
+          <p:cNvCxnSpPr>
+            <a:cxnSpLocks/>
+          </p:cNvCxnSpPr>
+          <p:nvPr/>
+        </p:nvCxnSpPr>
+        <p:spPr>
+          <a:xfrm>
+            <a:off x="722310" y="3681792"/>
+            <a:ext cx="5075330" cy="316698"/>
+          </a:xfrm>
+          <a:prstGeom prst="line">
+            <a:avLst/>
+          </a:prstGeom>
+          <a:ln w="38100"/>
+        </p:spPr>
+        <p:style>
+          <a:lnRef idx="3">
+            <a:schemeClr val="dk1"/>
+          </a:lnRef>
+          <a:fillRef idx="0">
+            <a:schemeClr val="dk1"/>
+          </a:fillRef>
+          <a:effectRef idx="2">
+            <a:schemeClr val="dk1"/>
+          </a:effectRef>
+          <a:fontRef idx="minor">
+            <a:schemeClr val="tx1"/>
+          </a:fontRef>
+        </p:style>
+      </p:cxnSp>
+      <p:cxnSp>
+        <p:nvCxnSpPr>
+          <p:cNvPr id="12" name="מחבר חץ ישר 11">
+            <a:extLst>
+              <a:ext uri="{FF2B5EF4-FFF2-40B4-BE49-F238E27FC236}">
+                <a16:creationId xmlns:a16="http://schemas.microsoft.com/office/drawing/2014/main" id="{581DE48F-CEB6-4C6C-81D3-370A4015C276}"/>
+              </a:ext>
+            </a:extLst>
+          </p:cNvPr>
+          <p:cNvCxnSpPr/>
+          <p:nvPr/>
+        </p:nvCxnSpPr>
+        <p:spPr>
+          <a:xfrm flipH="1" flipV="1">
+            <a:off x="1649506" y="593909"/>
+            <a:ext cx="430306" cy="419103"/>
+          </a:xfrm>
+          <a:prstGeom prst="straightConnector1">
+            <a:avLst/>
+          </a:prstGeom>
+          <a:ln w="44450">
+            <a:solidFill>
+              <a:schemeClr val="tx1"/>
+            </a:solidFill>
+            <a:tailEnd type="triangle"/>
+          </a:ln>
+          <a:effectLst>
+            <a:glow rad="101600">
+              <a:schemeClr val="bg2">
+                <a:lumMod val="75000"/>
+                <a:alpha val="40000"/>
+              </a:schemeClr>
+            </a:glow>
+          </a:effectLst>
+        </p:spPr>
+        <p:style>
+          <a:lnRef idx="1">
+            <a:schemeClr val="accent1"/>
+          </a:lnRef>
+          <a:fillRef idx="0">
+            <a:schemeClr val="accent1"/>
+          </a:fillRef>
+          <a:effectRef idx="0">
+            <a:schemeClr val="accent1"/>
+          </a:effectRef>
+          <a:fontRef idx="minor">
+            <a:schemeClr val="tx1"/>
+          </a:fontRef>
+        </p:style>
+      </p:cxnSp>
+    </p:spTree>
+    <p:extLst>
+      <p:ext uri="{BB962C8B-B14F-4D97-AF65-F5344CB8AC3E}">
+        <p14:creationId xmlns:p14="http://schemas.microsoft.com/office/powerpoint/2010/main" val="1542620820"/>
+      </p:ext>
+    </p:extLst>
+  </p:cSld>
+  <p:clrMapOvr>
+    <a:masterClrMapping/>
+  </p:clrMapOvr>
+</p:sld>
+</file>
+
+<file path=ppt/slides/slide11.xml><?xml version="1.0" encoding="utf-8"?>
+<p:sld xmlns:a="http://schemas.openxmlformats.org/drawingml/2006/main" xmlns:r="http://schemas.openxmlformats.org/officeDocument/2006/relationships" xmlns:p="http://schemas.openxmlformats.org/presentationml/2006/main">
+  <p:cSld>
+    <p:spTree>
+      <p:nvGrpSpPr>
+        <p:cNvPr id="1" name=""/>
+        <p:cNvGrpSpPr/>
+        <p:nvPr/>
+      </p:nvGrpSpPr>
+      <p:grpSpPr>
+        <a:xfrm>
+          <a:off x="0" y="0"/>
+          <a:ext cx="0" cy="0"/>
+          <a:chOff x="0" y="0"/>
+          <a:chExt cx="0" cy="0"/>
+        </a:xfrm>
+      </p:grpSpPr>
+      <p:sp>
+        <p:nvSpPr>
+          <p:cNvPr id="2" name="כותרת 1">
+            <a:extLst>
+              <a:ext uri="{FF2B5EF4-FFF2-40B4-BE49-F238E27FC236}">
+                <a16:creationId xmlns:a16="http://schemas.microsoft.com/office/drawing/2014/main" id="{95041EE5-D871-4A72-A872-FC0EC7E2BB6F}"/>
+              </a:ext>
+            </a:extLst>
+          </p:cNvPr>
+          <p:cNvSpPr>
+            <a:spLocks noGrp="1"/>
+          </p:cNvSpPr>
+          <p:nvPr>
+            <p:ph type="title"/>
+          </p:nvPr>
+        </p:nvSpPr>
+        <p:spPr/>
+        <p:txBody>
+          <a:bodyPr/>
+          <a:lstStyle/>
+          <a:p>
+            <a:r>
+              <a:rPr lang="en-US" dirty="0"/>
+              <a:t>What went as expected</a:t>
+            </a:r>
+            <a:endParaRPr lang="he-IL" dirty="0"/>
+          </a:p>
+        </p:txBody>
+      </p:sp>
+      <p:sp>
+        <p:nvSpPr>
+          <p:cNvPr id="3" name="מציין מיקום תוכן 2">
+            <a:extLst>
+              <a:ext uri="{FF2B5EF4-FFF2-40B4-BE49-F238E27FC236}">
+                <a16:creationId xmlns:a16="http://schemas.microsoft.com/office/drawing/2014/main" id="{8D518BB1-BDFD-4165-BFD0-4AA12383D561}"/>
+              </a:ext>
+            </a:extLst>
+          </p:cNvPr>
+          <p:cNvSpPr>
+            <a:spLocks noGrp="1"/>
+          </p:cNvSpPr>
+          <p:nvPr>
+            <p:ph idx="1"/>
+          </p:nvPr>
+        </p:nvSpPr>
+        <p:spPr>
+          <a:xfrm>
+            <a:off x="1340875" y="2129116"/>
+            <a:ext cx="10018713" cy="3124201"/>
+          </a:xfrm>
+        </p:spPr>
+        <p:txBody>
+          <a:bodyPr/>
+          <a:lstStyle/>
+          <a:p>
+            <a:pPr algn="l" rtl="0"/>
+            <a:r>
+              <a:rPr lang="en-US" dirty="0"/>
+              <a:t>Text normalization phase improved classifier results </a:t>
+            </a:r>
+          </a:p>
+          <a:p>
+            <a:pPr algn="l" rtl="0"/>
+            <a:r>
+              <a:rPr lang="en-US" dirty="0">
+                <a:highlight>
+                  <a:srgbClr val="FFFF00"/>
+                </a:highlight>
+              </a:rPr>
+              <a:t>The better the classifier, the better the results.</a:t>
+            </a:r>
+          </a:p>
+          <a:p>
+            <a:pPr algn="l" rtl="0"/>
+            <a:endParaRPr lang="en-US" dirty="0"/>
+          </a:p>
+          <a:p>
+            <a:pPr algn="l" rtl="0"/>
+            <a:endParaRPr lang="he-IL" dirty="0"/>
+          </a:p>
+        </p:txBody>
+      </p:sp>
+    </p:spTree>
+    <p:extLst>
+      <p:ext uri="{BB962C8B-B14F-4D97-AF65-F5344CB8AC3E}">
+        <p14:creationId xmlns:p14="http://schemas.microsoft.com/office/powerpoint/2010/main" val="829086379"/>
+      </p:ext>
+    </p:extLst>
+  </p:cSld>
+  <p:clrMapOvr>
+    <a:masterClrMapping/>
+  </p:clrMapOvr>
+</p:sld>
+</file>
+
+<file path=ppt/slides/slide12.xml><?xml version="1.0" encoding="utf-8"?>
+<p:sld xmlns:a="http://schemas.openxmlformats.org/drawingml/2006/main" xmlns:r="http://schemas.openxmlformats.org/officeDocument/2006/relationships" xmlns:p="http://schemas.openxmlformats.org/presentationml/2006/main">
+  <p:cSld>
+    <p:spTree>
+      <p:nvGrpSpPr>
+        <p:cNvPr id="1" name=""/>
+        <p:cNvGrpSpPr/>
+        <p:nvPr/>
+      </p:nvGrpSpPr>
+      <p:grpSpPr>
+        <a:xfrm>
+          <a:off x="0" y="0"/>
+          <a:ext cx="0" cy="0"/>
+          <a:chOff x="0" y="0"/>
+          <a:chExt cx="0" cy="0"/>
+        </a:xfrm>
+      </p:grpSpPr>
+      <p:sp>
+        <p:nvSpPr>
+          <p:cNvPr id="2" name="כותרת 1">
+            <a:extLst>
+              <a:ext uri="{FF2B5EF4-FFF2-40B4-BE49-F238E27FC236}">
+                <a16:creationId xmlns:a16="http://schemas.microsoft.com/office/drawing/2014/main" id="{AE5DE224-ABB6-451C-8F34-B6CD6485A03A}"/>
+              </a:ext>
+            </a:extLst>
+          </p:cNvPr>
+          <p:cNvSpPr>
+            <a:spLocks noGrp="1"/>
+          </p:cNvSpPr>
+          <p:nvPr>
+            <p:ph type="title"/>
+          </p:nvPr>
+        </p:nvSpPr>
+        <p:spPr/>
+        <p:txBody>
+          <a:bodyPr/>
+          <a:lstStyle/>
+          <a:p>
+            <a:r>
+              <a:rPr lang="en-US" dirty="0"/>
+              <a:t>Surprises and Insights so far</a:t>
+            </a:r>
+            <a:endParaRPr lang="he-IL" dirty="0"/>
+          </a:p>
+        </p:txBody>
+      </p:sp>
+      <p:sp>
+        <p:nvSpPr>
+          <p:cNvPr id="3" name="מציין מיקום תוכן 2">
+            <a:extLst>
+              <a:ext uri="{FF2B5EF4-FFF2-40B4-BE49-F238E27FC236}">
+                <a16:creationId xmlns:a16="http://schemas.microsoft.com/office/drawing/2014/main" id="{B0A24F53-E7D0-4A32-8E69-715B43C64BA0}"/>
+              </a:ext>
+            </a:extLst>
+          </p:cNvPr>
+          <p:cNvSpPr>
+            <a:spLocks noGrp="1"/>
+          </p:cNvSpPr>
+          <p:nvPr>
+            <p:ph idx="1"/>
+          </p:nvPr>
+        </p:nvSpPr>
+        <p:spPr/>
+        <p:txBody>
+          <a:bodyPr/>
+          <a:lstStyle/>
+          <a:p>
+            <a:pPr algn="l" rtl="0"/>
+            <a:r>
+              <a:rPr lang="en-US" dirty="0"/>
+              <a:t>Data – Hebrew slang, duplicate characters, spelling mistake</a:t>
+            </a:r>
+          </a:p>
+          <a:p>
+            <a:pPr marL="0" indent="0" algn="l" rtl="0">
+              <a:buNone/>
+            </a:pPr>
+            <a:r>
+              <a:rPr lang="en-US" dirty="0"/>
+              <a:t>Examples – </a:t>
+            </a:r>
+            <a:r>
+              <a:rPr lang="he-IL" dirty="0"/>
+              <a:t>"</a:t>
+            </a:r>
+            <a:r>
+              <a:rPr lang="he-IL" dirty="0" err="1"/>
+              <a:t>חיימשלי</a:t>
+            </a:r>
+            <a:r>
+              <a:rPr lang="he-IL" dirty="0"/>
+              <a:t>", "</a:t>
+            </a:r>
+            <a:r>
+              <a:rPr lang="he-IL" dirty="0" err="1"/>
+              <a:t>טוווווב</a:t>
+            </a:r>
+            <a:r>
+              <a:rPr lang="he-IL" dirty="0"/>
+              <a:t>", "אמשך", "</a:t>
+            </a:r>
+            <a:r>
+              <a:rPr lang="he-IL" dirty="0" err="1"/>
+              <a:t>מצתערת</a:t>
+            </a:r>
+            <a:r>
+              <a:rPr lang="he-IL" dirty="0"/>
+              <a:t>"</a:t>
+            </a:r>
+            <a:endParaRPr lang="en-US" dirty="0"/>
+          </a:p>
+          <a:p>
+            <a:pPr algn="l" rtl="0">
+              <a:buFont typeface="Arial" panose="020B0604020202020204" pitchFamily="34" charset="0"/>
+              <a:buChar char="•"/>
+            </a:pPr>
+            <a:r>
+              <a:rPr lang="en-US" dirty="0"/>
+              <a:t>Yap – incorrect lemmatization for strong word</a:t>
+            </a:r>
+          </a:p>
+          <a:p>
+            <a:pPr marL="0" indent="0" algn="l" rtl="0">
+              <a:buNone/>
+            </a:pPr>
+            <a:r>
+              <a:rPr lang="en-US" dirty="0"/>
+              <a:t>Examples –  “</a:t>
+            </a:r>
+            <a:r>
+              <a:rPr lang="he-IL" dirty="0"/>
+              <a:t>מכות -&gt; מך</a:t>
+            </a:r>
+            <a:r>
+              <a:rPr lang="en-US" dirty="0"/>
+              <a:t>“</a:t>
+            </a:r>
+          </a:p>
+          <a:p>
+            <a:pPr marL="0" indent="0" algn="l" rtl="0">
+              <a:buNone/>
+            </a:pPr>
+            <a:endParaRPr lang="en-US" dirty="0"/>
+          </a:p>
+          <a:p>
+            <a:pPr marL="0" indent="0" algn="l" rtl="0">
+              <a:buNone/>
+            </a:pPr>
+            <a:endParaRPr lang="he-IL" dirty="0"/>
+          </a:p>
+        </p:txBody>
+      </p:sp>
+    </p:spTree>
+    <p:extLst>
+      <p:ext uri="{BB962C8B-B14F-4D97-AF65-F5344CB8AC3E}">
+        <p14:creationId xmlns:p14="http://schemas.microsoft.com/office/powerpoint/2010/main" val="4269887435"/>
+      </p:ext>
+    </p:extLst>
+  </p:cSld>
+  <p:clrMapOvr>
+    <a:masterClrMapping/>
+  </p:clrMapOvr>
+</p:sld>
+</file>
+
+<file path=ppt/slides/slide13.xml><?xml version="1.0" encoding="utf-8"?>
+<p:sld xmlns:a="http://schemas.openxmlformats.org/drawingml/2006/main" xmlns:r="http://schemas.openxmlformats.org/officeDocument/2006/relationships" xmlns:p="http://schemas.openxmlformats.org/presentationml/2006/main">
+  <p:cSld>
+    <p:spTree>
+      <p:nvGrpSpPr>
+        <p:cNvPr id="1" name=""/>
+        <p:cNvGrpSpPr/>
+        <p:nvPr/>
+      </p:nvGrpSpPr>
+      <p:grpSpPr>
+        <a:xfrm>
+          <a:off x="0" y="0"/>
+          <a:ext cx="0" cy="0"/>
+          <a:chOff x="0" y="0"/>
+          <a:chExt cx="0" cy="0"/>
+        </a:xfrm>
+      </p:grpSpPr>
+      <p:sp>
+        <p:nvSpPr>
+          <p:cNvPr id="2" name="כותרת 1">
+            <a:extLst>
+              <a:ext uri="{FF2B5EF4-FFF2-40B4-BE49-F238E27FC236}">
+                <a16:creationId xmlns:a16="http://schemas.microsoft.com/office/drawing/2014/main" id="{A14CF546-9CEA-4487-B737-45C15E3B789D}"/>
+              </a:ext>
+            </a:extLst>
+          </p:cNvPr>
+          <p:cNvSpPr>
+            <a:spLocks noGrp="1"/>
+          </p:cNvSpPr>
+          <p:nvPr>
+            <p:ph type="title"/>
+          </p:nvPr>
+        </p:nvSpPr>
+        <p:spPr/>
+        <p:txBody>
+          <a:bodyPr/>
+          <a:lstStyle/>
+          <a:p>
+            <a:r>
+              <a:rPr lang="en-US"/>
+              <a:t>Summery</a:t>
+            </a:r>
+            <a:endParaRPr lang="he-IL"/>
+          </a:p>
+        </p:txBody>
+      </p:sp>
+      <p:sp>
+        <p:nvSpPr>
+          <p:cNvPr id="3" name="מציין מיקום תוכן 2">
+            <a:extLst>
+              <a:ext uri="{FF2B5EF4-FFF2-40B4-BE49-F238E27FC236}">
+                <a16:creationId xmlns:a16="http://schemas.microsoft.com/office/drawing/2014/main" id="{D255AA8C-E6E0-4744-9EA8-6EAA1A6AB9D0}"/>
+              </a:ext>
+            </a:extLst>
+          </p:cNvPr>
+          <p:cNvSpPr>
+            <a:spLocks noGrp="1"/>
+          </p:cNvSpPr>
+          <p:nvPr>
+            <p:ph idx="1"/>
+          </p:nvPr>
+        </p:nvSpPr>
+        <p:spPr/>
+        <p:txBody>
+          <a:bodyPr/>
+          <a:lstStyle/>
+          <a:p>
+            <a:endParaRPr lang="he-IL"/>
+          </a:p>
+        </p:txBody>
+      </p:sp>
+    </p:spTree>
+    <p:extLst>
+      <p:ext uri="{BB962C8B-B14F-4D97-AF65-F5344CB8AC3E}">
+        <p14:creationId xmlns:p14="http://schemas.microsoft.com/office/powerpoint/2010/main" val="3104253907"/>
+      </p:ext>
+    </p:extLst>
+  </p:cSld>
+  <p:clrMapOvr>
+    <a:masterClrMapping/>
+  </p:clrMapOvr>
+</p:sld>
+</file>
+
+<file path=ppt/slides/slide14.xml><?xml version="1.0" encoding="utf-8"?>
+<p:sld xmlns:a="http://schemas.openxmlformats.org/drawingml/2006/main" xmlns:r="http://schemas.openxmlformats.org/officeDocument/2006/relationships" xmlns:p="http://schemas.openxmlformats.org/presentationml/2006/main">
+  <p:cSld>
+    <p:spTree>
+      <p:nvGrpSpPr>
+        <p:cNvPr id="1" name=""/>
+        <p:cNvGrpSpPr/>
+        <p:nvPr/>
+      </p:nvGrpSpPr>
+      <p:grpSpPr>
+        <a:xfrm>
+          <a:off x="0" y="0"/>
+          <a:ext cx="0" cy="0"/>
+          <a:chOff x="0" y="0"/>
+          <a:chExt cx="0" cy="0"/>
+        </a:xfrm>
+      </p:grpSpPr>
+      <p:sp>
+        <p:nvSpPr>
+          <p:cNvPr id="2" name="כותרת 1">
+            <a:extLst>
+              <a:ext uri="{FF2B5EF4-FFF2-40B4-BE49-F238E27FC236}">
+                <a16:creationId xmlns:a16="http://schemas.microsoft.com/office/drawing/2014/main" id="{C23B2CBF-9DBA-4F11-A48C-480E1807348F}"/>
+              </a:ext>
+            </a:extLst>
+          </p:cNvPr>
+          <p:cNvSpPr>
+            <a:spLocks noGrp="1"/>
+          </p:cNvSpPr>
+          <p:nvPr>
+            <p:ph type="title"/>
+          </p:nvPr>
+        </p:nvSpPr>
+        <p:spPr/>
+        <p:txBody>
+          <a:bodyPr/>
+          <a:lstStyle/>
+          <a:p>
+            <a:r>
+              <a:rPr lang="en-US" dirty="0"/>
+              <a:t>Further work</a:t>
+            </a:r>
+            <a:endParaRPr lang="he-IL" dirty="0"/>
+          </a:p>
+        </p:txBody>
+      </p:sp>
+      <p:sp>
+        <p:nvSpPr>
+          <p:cNvPr id="3" name="מציין מיקום תוכן 2">
+            <a:extLst>
+              <a:ext uri="{FF2B5EF4-FFF2-40B4-BE49-F238E27FC236}">
+                <a16:creationId xmlns:a16="http://schemas.microsoft.com/office/drawing/2014/main" id="{1F6D9237-BC4C-4D4E-8ABF-F46E4B98D3B9}"/>
+              </a:ext>
+            </a:extLst>
+          </p:cNvPr>
+          <p:cNvSpPr>
+            <a:spLocks noGrp="1"/>
+          </p:cNvSpPr>
+          <p:nvPr>
+            <p:ph idx="1"/>
+          </p:nvPr>
+        </p:nvSpPr>
+        <p:spPr/>
+        <p:txBody>
+          <a:bodyPr>
+            <a:normAutofit/>
+          </a:bodyPr>
+          <a:lstStyle/>
+          <a:p>
+            <a:pPr algn="l" rtl="0"/>
+            <a:r>
+              <a:rPr lang="en-US" sz="2800" dirty="0"/>
+              <a:t>Violence score</a:t>
+            </a:r>
+          </a:p>
+          <a:p>
+            <a:pPr algn="l" rtl="0"/>
+            <a:r>
+              <a:rPr lang="en-US" sz="2800" dirty="0"/>
+              <a:t>Trained the models with more various data</a:t>
+            </a:r>
+          </a:p>
+          <a:p>
+            <a:pPr algn="l" rtl="0"/>
+            <a:r>
+              <a:rPr lang="en-US" sz="2800" dirty="0"/>
+              <a:t>Classified message by violence type</a:t>
+            </a:r>
+          </a:p>
+          <a:p>
+            <a:pPr algn="l" rtl="0"/>
+            <a:r>
+              <a:rPr lang="en-US" sz="2800" dirty="0"/>
+              <a:t>Auto-fix violent messages to non-violent messages</a:t>
+            </a:r>
+          </a:p>
+          <a:p>
+            <a:pPr algn="l" rtl="0"/>
+            <a:endParaRPr lang="he-IL" sz="2800" dirty="0"/>
+          </a:p>
+        </p:txBody>
+      </p:sp>
+    </p:spTree>
+    <p:extLst>
+      <p:ext uri="{BB962C8B-B14F-4D97-AF65-F5344CB8AC3E}">
+        <p14:creationId xmlns:p14="http://schemas.microsoft.com/office/powerpoint/2010/main" val="3406069024"/>
       </p:ext>
     </p:extLst>
   </p:cSld>
@@ -12644,7 +13508,7 @@
             <p:ph idx="1"/>
             <p:extLst>
               <p:ext uri="{D42A27DB-BD31-4B8C-83A1-F6EECF244321}">
-                <p14:modId xmlns:p14="http://schemas.microsoft.com/office/powerpoint/2010/main" val="4143464584"/>
+                <p14:modId xmlns:p14="http://schemas.microsoft.com/office/powerpoint/2010/main" val="872078256"/>
               </p:ext>
             </p:extLst>
           </p:nvPr>
@@ -12673,6 +13537,222 @@
 </file>
 
 <file path=ppt/slides/slide7.xml><?xml version="1.0" encoding="utf-8"?>
+<p:sld xmlns:a="http://schemas.openxmlformats.org/drawingml/2006/main" xmlns:r="http://schemas.openxmlformats.org/officeDocument/2006/relationships" xmlns:p="http://schemas.openxmlformats.org/presentationml/2006/main">
+  <p:cSld>
+    <p:spTree>
+      <p:nvGrpSpPr>
+        <p:cNvPr id="1" name=""/>
+        <p:cNvGrpSpPr/>
+        <p:nvPr/>
+      </p:nvGrpSpPr>
+      <p:grpSpPr>
+        <a:xfrm>
+          <a:off x="0" y="0"/>
+          <a:ext cx="0" cy="0"/>
+          <a:chOff x="0" y="0"/>
+          <a:chExt cx="0" cy="0"/>
+        </a:xfrm>
+      </p:grpSpPr>
+      <p:sp>
+        <p:nvSpPr>
+          <p:cNvPr id="2" name="כותרת 1">
+            <a:extLst>
+              <a:ext uri="{FF2B5EF4-FFF2-40B4-BE49-F238E27FC236}">
+                <a16:creationId xmlns:a16="http://schemas.microsoft.com/office/drawing/2014/main" id="{BC519655-68CD-4DBF-95B1-279755F0EB8F}"/>
+              </a:ext>
+            </a:extLst>
+          </p:cNvPr>
+          <p:cNvSpPr>
+            <a:spLocks noGrp="1"/>
+          </p:cNvSpPr>
+          <p:nvPr>
+            <p:ph type="title"/>
+          </p:nvPr>
+        </p:nvSpPr>
+        <p:spPr>
+          <a:xfrm>
+            <a:off x="1484311" y="-49297"/>
+            <a:ext cx="10018713" cy="1752599"/>
+          </a:xfrm>
+        </p:spPr>
+        <p:txBody>
+          <a:bodyPr/>
+          <a:lstStyle/>
+          <a:p>
+            <a:r>
+              <a:rPr lang="en-US" dirty="0"/>
+              <a:t>Data - Pie charts</a:t>
+            </a:r>
+            <a:endParaRPr lang="he-IL" dirty="0"/>
+          </a:p>
+        </p:txBody>
+      </p:sp>
+      <p:pic>
+        <p:nvPicPr>
+          <p:cNvPr id="4" name="תמונה 3">
+            <a:extLst>
+              <a:ext uri="{FF2B5EF4-FFF2-40B4-BE49-F238E27FC236}">
+                <a16:creationId xmlns:a16="http://schemas.microsoft.com/office/drawing/2014/main" id="{C1B9315E-21D8-4F75-BE36-4F1389CA4B8C}"/>
+              </a:ext>
+            </a:extLst>
+          </p:cNvPr>
+          <p:cNvPicPr>
+            <a:picLocks noChangeAspect="1"/>
+          </p:cNvPicPr>
+          <p:nvPr/>
+        </p:nvPicPr>
+        <p:blipFill>
+          <a:blip r:embed="rId2">
+            <a:extLst>
+              <a:ext uri="{BEBA8EAE-BF5A-486C-A8C5-ECC9F3942E4B}">
+                <a14:imgProps xmlns:a14="http://schemas.microsoft.com/office/drawing/2010/main">
+                  <a14:imgLayer r:embed="rId3">
+                    <a14:imgEffect>
+                      <a14:backgroundRemoval t="8542" b="91042" l="10000" r="90000">
+                        <a14:foregroundMark x1="38594" y1="10208" x2="45000" y2="8542"/>
+                        <a14:foregroundMark x1="45000" y1="8542" x2="60000" y2="10625"/>
+                        <a14:foregroundMark x1="41094" y1="87292" x2="47656" y2="91250"/>
+                        <a14:foregroundMark x1="47656" y1="91250" x2="54688" y2="91042"/>
+                        <a14:foregroundMark x1="54688" y1="91042" x2="58125" y2="88750"/>
+                      </a14:backgroundRemoval>
+                    </a14:imgEffect>
+                  </a14:imgLayer>
+                </a14:imgProps>
+              </a:ext>
+            </a:extLst>
+          </a:blip>
+          <a:stretch>
+            <a:fillRect/>
+          </a:stretch>
+        </p:blipFill>
+        <p:spPr>
+          <a:xfrm>
+            <a:off x="2259105" y="1102657"/>
+            <a:ext cx="7673789" cy="5755343"/>
+          </a:xfrm>
+          <a:prstGeom prst="rect">
+            <a:avLst/>
+          </a:prstGeom>
+        </p:spPr>
+      </p:pic>
+      <p:sp>
+        <p:nvSpPr>
+          <p:cNvPr id="5" name="TextBox 4">
+            <a:extLst>
+              <a:ext uri="{FF2B5EF4-FFF2-40B4-BE49-F238E27FC236}">
+                <a16:creationId xmlns:a16="http://schemas.microsoft.com/office/drawing/2014/main" id="{40179D36-3726-4F80-A3EB-4DEB27D8C541}"/>
+              </a:ext>
+            </a:extLst>
+          </p:cNvPr>
+          <p:cNvSpPr txBox="1"/>
+          <p:nvPr/>
+        </p:nvSpPr>
+        <p:spPr>
+          <a:xfrm>
+            <a:off x="8251359" y="2294965"/>
+            <a:ext cx="2466600" cy="400110"/>
+          </a:xfrm>
+          <a:prstGeom prst="rect">
+            <a:avLst/>
+          </a:prstGeom>
+          <a:noFill/>
+        </p:spPr>
+        <p:txBody>
+          <a:bodyPr wrap="square" rtlCol="1">
+            <a:spAutoFit/>
+          </a:bodyPr>
+          <a:lstStyle/>
+          <a:p>
+            <a:r>
+              <a:rPr lang="en-US" sz="2000" b="1" dirty="0">
+                <a:effectLst>
+                  <a:outerShdw blurRad="38100" dist="38100" dir="2700000" algn="tl">
+                    <a:srgbClr val="000000">
+                      <a:alpha val="43137"/>
+                    </a:srgbClr>
+                  </a:outerShdw>
+                </a:effectLst>
+              </a:rPr>
+              <a:t>Negative data</a:t>
+            </a:r>
+            <a:endParaRPr lang="he-IL" sz="2000" b="1" dirty="0">
+              <a:effectLst>
+                <a:outerShdw blurRad="38100" dist="38100" dir="2700000" algn="tl">
+                  <a:srgbClr val="000000">
+                    <a:alpha val="43137"/>
+                  </a:srgbClr>
+                </a:outerShdw>
+              </a:effectLst>
+            </a:endParaRPr>
+          </a:p>
+        </p:txBody>
+      </p:sp>
+      <p:sp>
+        <p:nvSpPr>
+          <p:cNvPr id="8" name="TextBox 7">
+            <a:extLst>
+              <a:ext uri="{FF2B5EF4-FFF2-40B4-BE49-F238E27FC236}">
+                <a16:creationId xmlns:a16="http://schemas.microsoft.com/office/drawing/2014/main" id="{AC5964EB-CB22-444C-B249-1CB47DBB88CF}"/>
+              </a:ext>
+            </a:extLst>
+          </p:cNvPr>
+          <p:cNvSpPr txBox="1"/>
+          <p:nvPr/>
+        </p:nvSpPr>
+        <p:spPr>
+          <a:xfrm>
+            <a:off x="1805734" y="3446923"/>
+            <a:ext cx="2466600" cy="400110"/>
+          </a:xfrm>
+          <a:prstGeom prst="rect">
+            <a:avLst/>
+          </a:prstGeom>
+          <a:noFill/>
+        </p:spPr>
+        <p:txBody>
+          <a:bodyPr wrap="square" rtlCol="1">
+            <a:spAutoFit/>
+          </a:bodyPr>
+          <a:lstStyle/>
+          <a:p>
+            <a:r>
+              <a:rPr lang="en-US" sz="2000" b="1" dirty="0">
+                <a:effectLst>
+                  <a:outerShdw blurRad="38100" dist="38100" dir="2700000" algn="tl">
+                    <a:srgbClr val="000000">
+                      <a:alpha val="43137"/>
+                    </a:srgbClr>
+                  </a:outerShdw>
+                </a:effectLst>
+              </a:rPr>
+              <a:t>Positive data</a:t>
+            </a:r>
+            <a:endParaRPr lang="he-IL" sz="2000" b="1" dirty="0">
+              <a:effectLst>
+                <a:outerShdw blurRad="38100" dist="38100" dir="2700000" algn="tl">
+                  <a:srgbClr val="000000">
+                    <a:alpha val="43137"/>
+                  </a:srgbClr>
+                </a:outerShdw>
+              </a:effectLst>
+            </a:endParaRPr>
+          </a:p>
+        </p:txBody>
+      </p:sp>
+    </p:spTree>
+    <p:extLst>
+      <p:ext uri="{BB962C8B-B14F-4D97-AF65-F5344CB8AC3E}">
+        <p14:creationId xmlns:p14="http://schemas.microsoft.com/office/powerpoint/2010/main" val="1796522142"/>
+      </p:ext>
+    </p:extLst>
+  </p:cSld>
+  <p:clrMapOvr>
+    <a:masterClrMapping/>
+  </p:clrMapOvr>
+</p:sld>
+</file>
+
+<file path=ppt/slides/slide8.xml><?xml version="1.0" encoding="utf-8"?>
 <p:sld xmlns:a="http://schemas.openxmlformats.org/drawingml/2006/main" xmlns:r="http://schemas.openxmlformats.org/officeDocument/2006/relationships" xmlns:p="http://schemas.openxmlformats.org/presentationml/2006/main">
   <p:cSld>
     <p:spTree>
@@ -12938,7 +14018,14 @@
                 <a:headEnd type="none" w="med" len="med"/>
                 <a:tailEnd type="none" w="med" len="med"/>
               </a:ln>
-              <a:effectLst/>
+              <a:effectLst>
+                <a:glow rad="139700">
+                  <a:schemeClr val="accent2">
+                    <a:satMod val="175000"/>
+                    <a:alpha val="40000"/>
+                  </a:schemeClr>
+                </a:glow>
+              </a:effectLst>
             </p:spPr>
             <p:txBody>
               <a:bodyPr rtlCol="1" anchor="ctr"/>
@@ -13037,7 +14124,14 @@
                 <a:headEnd type="none" w="med" len="med"/>
                 <a:tailEnd type="none" w="med" len="med"/>
               </a:ln>
-              <a:effectLst/>
+              <a:effectLst>
+                <a:glow rad="139700">
+                  <a:schemeClr val="accent2">
+                    <a:satMod val="175000"/>
+                    <a:alpha val="40000"/>
+                  </a:schemeClr>
+                </a:glow>
+              </a:effectLst>
             </p:spPr>
             <p:txBody>
               <a:bodyPr rtlCol="1" anchor="ctr"/>
@@ -13124,7 +14218,14 @@
                 <a:headEnd type="none" w="med" len="med"/>
                 <a:tailEnd type="none" w="med" len="med"/>
               </a:ln>
-              <a:effectLst/>
+              <a:effectLst>
+                <a:glow rad="139700">
+                  <a:schemeClr val="accent2">
+                    <a:satMod val="175000"/>
+                    <a:alpha val="40000"/>
+                  </a:schemeClr>
+                </a:glow>
+              </a:effectLst>
             </p:spPr>
             <p:txBody>
               <a:bodyPr rtlCol="1" anchor="ctr"/>
@@ -13211,7 +14312,14 @@
                 <a:headEnd type="none" w="med" len="med"/>
                 <a:tailEnd type="none" w="med" len="med"/>
               </a:ln>
-              <a:effectLst/>
+              <a:effectLst>
+                <a:glow rad="139700">
+                  <a:schemeClr val="accent6">
+                    <a:satMod val="175000"/>
+                    <a:alpha val="40000"/>
+                  </a:schemeClr>
+                </a:glow>
+              </a:effectLst>
             </p:spPr>
             <p:txBody>
               <a:bodyPr rtlCol="1" anchor="ctr"/>
@@ -13310,7 +14418,14 @@
                 <a:headEnd type="none" w="med" len="med"/>
                 <a:tailEnd type="none" w="med" len="med"/>
               </a:ln>
-              <a:effectLst/>
+              <a:effectLst>
+                <a:glow rad="139700">
+                  <a:schemeClr val="accent2">
+                    <a:satMod val="175000"/>
+                    <a:alpha val="40000"/>
+                  </a:schemeClr>
+                </a:glow>
+              </a:effectLst>
             </p:spPr>
             <p:txBody>
               <a:bodyPr rtlCol="1" anchor="ctr"/>
@@ -13397,7 +14512,14 @@
                 <a:headEnd type="none" w="med" len="med"/>
                 <a:tailEnd type="none" w="med" len="med"/>
               </a:ln>
-              <a:effectLst/>
+              <a:effectLst>
+                <a:glow rad="139700">
+                  <a:schemeClr val="accent2">
+                    <a:satMod val="175000"/>
+                    <a:alpha val="40000"/>
+                  </a:schemeClr>
+                </a:glow>
+              </a:effectLst>
             </p:spPr>
             <p:txBody>
               <a:bodyPr rtlCol="1" anchor="ctr"/>
@@ -13484,7 +14606,14 @@
                 <a:headEnd type="none" w="med" len="med"/>
                 <a:tailEnd type="none" w="med" len="med"/>
               </a:ln>
-              <a:effectLst/>
+              <a:effectLst>
+                <a:glow rad="139700">
+                  <a:schemeClr val="accent2">
+                    <a:satMod val="175000"/>
+                    <a:alpha val="40000"/>
+                  </a:schemeClr>
+                </a:glow>
+              </a:effectLst>
             </p:spPr>
             <p:txBody>
               <a:bodyPr rtlCol="1" anchor="ctr"/>
@@ -13618,7 +14747,14 @@
                 <a:headEnd type="none" w="med" len="med"/>
                 <a:tailEnd type="none" w="med" len="med"/>
               </a:ln>
-              <a:effectLst/>
+              <a:effectLst>
+                <a:glow rad="139700">
+                  <a:schemeClr val="accent6">
+                    <a:satMod val="175000"/>
+                    <a:alpha val="40000"/>
+                  </a:schemeClr>
+                </a:glow>
+              </a:effectLst>
             </p:spPr>
             <p:txBody>
               <a:bodyPr rtlCol="1" anchor="ctr"/>
@@ -13733,7 +14869,14 @@
                 <a:headEnd type="none" w="med" len="med"/>
                 <a:tailEnd type="none" w="med" len="med"/>
               </a:ln>
-              <a:effectLst/>
+              <a:effectLst>
+                <a:glow rad="139700">
+                  <a:schemeClr val="accent5">
+                    <a:satMod val="175000"/>
+                    <a:alpha val="40000"/>
+                  </a:schemeClr>
+                </a:glow>
+              </a:effectLst>
             </p:spPr>
             <p:txBody>
               <a:bodyPr rtlCol="1" anchor="ctr"/>
@@ -14184,7 +15327,7 @@
           </p:nvSpPr>
           <p:spPr>
             <a:xfrm>
-              <a:off x="7903726" y="4743552"/>
+              <a:off x="8692614" y="4743552"/>
               <a:ext cx="1499747" cy="1495884"/>
             </a:xfrm>
             <a:prstGeom prst="can">
@@ -14200,7 +15343,14 @@
               <a:headEnd type="none" w="med" len="med"/>
               <a:tailEnd type="none" w="med" len="med"/>
             </a:ln>
-            <a:effectLst/>
+            <a:effectLst>
+              <a:glow rad="139700">
+                <a:schemeClr val="accent2">
+                  <a:satMod val="175000"/>
+                  <a:alpha val="40000"/>
+                </a:schemeClr>
+              </a:glow>
+            </a:effectLst>
           </p:spPr>
           <p:txBody>
             <a:bodyPr rtlCol="1" anchor="ctr"/>
@@ -14292,12 +15442,134 @@
           </p:txBody>
         </p:sp>
       </p:grpSp>
+      <p:sp>
+        <p:nvSpPr>
+          <p:cNvPr id="26" name="גליל 25">
+            <a:extLst>
+              <a:ext uri="{FF2B5EF4-FFF2-40B4-BE49-F238E27FC236}">
+                <a16:creationId xmlns:a16="http://schemas.microsoft.com/office/drawing/2014/main" id="{71F93C3B-DF7C-41DD-823B-0702C09C35B6}"/>
+              </a:ext>
+            </a:extLst>
+          </p:cNvPr>
+          <p:cNvSpPr/>
+          <p:nvPr/>
+        </p:nvSpPr>
+        <p:spPr>
+          <a:xfrm>
+            <a:off x="6867061" y="4743552"/>
+            <a:ext cx="1499747" cy="1495884"/>
+          </a:xfrm>
+          <a:prstGeom prst="can">
+            <a:avLst/>
+          </a:prstGeom>
+          <a:gradFill>
+            <a:gsLst>
+              <a:gs pos="0">
+                <a:schemeClr val="accent1">
+                  <a:lumMod val="5000"/>
+                  <a:lumOff val="95000"/>
+                </a:schemeClr>
+              </a:gs>
+              <a:gs pos="74000">
+                <a:schemeClr val="accent1">
+                  <a:lumMod val="45000"/>
+                  <a:lumOff val="55000"/>
+                </a:schemeClr>
+              </a:gs>
+              <a:gs pos="83000">
+                <a:schemeClr val="accent1">
+                  <a:lumMod val="45000"/>
+                  <a:lumOff val="55000"/>
+                </a:schemeClr>
+              </a:gs>
+              <a:gs pos="100000">
+                <a:schemeClr val="accent1">
+                  <a:lumMod val="30000"/>
+                  <a:lumOff val="70000"/>
+                </a:schemeClr>
+              </a:gs>
+            </a:gsLst>
+            <a:lin ang="5400000" scaled="1"/>
+          </a:gradFill>
+          <a:ln w="31750" cap="flat" cmpd="sng" algn="ctr">
+            <a:solidFill>
+              <a:sysClr val="windowText" lastClr="000000"/>
+            </a:solidFill>
+            <a:prstDash val="solid"/>
+            <a:round/>
+            <a:headEnd type="none" w="med" len="med"/>
+            <a:tailEnd type="none" w="med" len="med"/>
+          </a:ln>
+          <a:effectLst>
+            <a:glow rad="139700">
+              <a:schemeClr val="accent6">
+                <a:satMod val="175000"/>
+                <a:alpha val="40000"/>
+              </a:schemeClr>
+            </a:glow>
+          </a:effectLst>
+        </p:spPr>
+        <p:txBody>
+          <a:bodyPr rtlCol="1" anchor="ctr"/>
+          <a:lstStyle/>
+          <a:p>
+            <a:pPr marL="0" marR="0" lvl="0" indent="0" algn="ctr" defTabSz="914400" rtl="1" eaLnBrk="1" fontAlgn="auto" latinLnBrk="0" hangingPunct="1">
+              <a:lnSpc>
+                <a:spcPct val="100000"/>
+              </a:lnSpc>
+              <a:spcBef>
+                <a:spcPts val="0"/>
+              </a:spcBef>
+              <a:spcAft>
+                <a:spcPts val="0"/>
+              </a:spcAft>
+              <a:buClrTx/>
+              <a:buSzTx/>
+              <a:buFontTx/>
+              <a:buNone/>
+              <a:tabLst/>
+              <a:defRPr/>
+            </a:pPr>
+            <a:r>
+              <a:rPr kumimoji="0" lang="en-US" sz="2400" b="0" i="0" u="none" strike="noStrike" kern="0" cap="none" spc="0" normalizeH="0" baseline="0" noProof="0" dirty="0">
+                <a:ln>
+                  <a:noFill/>
+                </a:ln>
+                <a:solidFill>
+                  <a:prstClr val="black"/>
+                </a:solidFill>
+                <a:effectLst/>
+                <a:uLnTx/>
+                <a:uFillTx/>
+                <a:latin typeface="Calibri" panose="020F0502020204030204"/>
+                <a:ea typeface="+mn-ea"/>
+                <a:cs typeface="Arial" panose="020B0604020202020204" pitchFamily="34" charset="0"/>
+              </a:rPr>
+              <a:t>Bert</a:t>
+            </a:r>
+            <a:endParaRPr kumimoji="0" lang="he-IL" sz="2400" b="0" i="0" u="none" strike="noStrike" kern="0" cap="none" spc="0" normalizeH="0" baseline="0" noProof="0" dirty="0">
+              <a:ln>
+                <a:noFill/>
+              </a:ln>
+              <a:solidFill>
+                <a:prstClr val="black"/>
+              </a:solidFill>
+              <a:effectLst/>
+              <a:uLnTx/>
+              <a:uFillTx/>
+              <a:latin typeface="Calibri" panose="020F0502020204030204"/>
+              <a:ea typeface="+mn-ea"/>
+              <a:cs typeface="Arial" panose="020B0604020202020204" pitchFamily="34" charset="0"/>
+            </a:endParaRPr>
+          </a:p>
+        </p:txBody>
+      </p:sp>
       <p:pic>
         <p:nvPicPr>
-          <p:cNvPr id="30" name="תמונה 29">
+          <p:cNvPr id="27" name="תמונה 26">
             <a:extLst>
               <a:ext uri="{FF2B5EF4-FFF2-40B4-BE49-F238E27FC236}">
-                <a16:creationId xmlns:a16="http://schemas.microsoft.com/office/drawing/2014/main" id="{76B3F63F-42D4-475B-B066-40092D57F06D}"/>
+                <a16:creationId xmlns:a16="http://schemas.microsoft.com/office/drawing/2014/main" id="{77C461AA-2CEC-4D4D-88D0-076852292D4F}"/>
               </a:ext>
             </a:extLst>
           </p:cNvPr>
@@ -14313,9 +15585,39 @@
           </a:stretch>
         </p:blipFill>
         <p:spPr>
-          <a:xfrm>
-            <a:off x="8531773" y="4284199"/>
-            <a:ext cx="199686" cy="526831"/>
+          <a:xfrm rot="19195336">
+            <a:off x="8711042" y="4192343"/>
+            <a:ext cx="249081" cy="657150"/>
+          </a:xfrm>
+          <a:prstGeom prst="rect">
+            <a:avLst/>
+          </a:prstGeom>
+        </p:spPr>
+      </p:pic>
+      <p:pic>
+        <p:nvPicPr>
+          <p:cNvPr id="28" name="תמונה 27">
+            <a:extLst>
+              <a:ext uri="{FF2B5EF4-FFF2-40B4-BE49-F238E27FC236}">
+                <a16:creationId xmlns:a16="http://schemas.microsoft.com/office/drawing/2014/main" id="{F7A71241-9266-4837-B671-CA4C22765EF7}"/>
+              </a:ext>
+            </a:extLst>
+          </p:cNvPr>
+          <p:cNvPicPr>
+            <a:picLocks noChangeAspect="1"/>
+          </p:cNvPicPr>
+          <p:nvPr/>
+        </p:nvPicPr>
+        <p:blipFill>
+          <a:blip r:embed="rId3"/>
+          <a:stretch>
+            <a:fillRect/>
+          </a:stretch>
+        </p:blipFill>
+        <p:spPr>
+          <a:xfrm rot="2378941">
+            <a:off x="8099860" y="4208255"/>
+            <a:ext cx="235415" cy="621096"/>
           </a:xfrm>
           <a:prstGeom prst="rect">
             <a:avLst/>
@@ -14335,7 +15637,7 @@
 </p:sld>
 </file>
 
-<file path=ppt/slides/slide8.xml><?xml version="1.0" encoding="utf-8"?>
+<file path=ppt/slides/slide9.xml><?xml version="1.0" encoding="utf-8"?>
 <p:sld xmlns:a="http://schemas.openxmlformats.org/drawingml/2006/main" xmlns:r="http://schemas.openxmlformats.org/officeDocument/2006/relationships" xmlns:p="http://schemas.openxmlformats.org/presentationml/2006/main">
   <p:cSld>
     <p:spTree>
@@ -14368,37 +15670,206 @@
             <p:ph type="title"/>
           </p:nvPr>
         </p:nvSpPr>
-        <p:spPr/>
+        <p:spPr>
+          <a:xfrm>
+            <a:off x="1484311" y="-67236"/>
+            <a:ext cx="10018713" cy="1752599"/>
+          </a:xfrm>
+        </p:spPr>
         <p:txBody>
           <a:bodyPr/>
           <a:lstStyle/>
           <a:p>
-            <a:endParaRPr lang="he-IL"/>
+            <a:r>
+              <a:rPr lang="en-US" dirty="0"/>
+              <a:t>First Results</a:t>
+            </a:r>
+            <a:endParaRPr lang="he-IL" dirty="0"/>
+          </a:p>
+        </p:txBody>
+      </p:sp>
+      <p:pic>
+        <p:nvPicPr>
+          <p:cNvPr id="5" name="תמונה 4">
+            <a:extLst>
+              <a:ext uri="{FF2B5EF4-FFF2-40B4-BE49-F238E27FC236}">
+                <a16:creationId xmlns:a16="http://schemas.microsoft.com/office/drawing/2014/main" id="{4FB570FB-67FA-44CE-887A-358C22B025E9}"/>
+              </a:ext>
+            </a:extLst>
+          </p:cNvPr>
+          <p:cNvPicPr>
+            <a:picLocks noChangeAspect="1"/>
+          </p:cNvPicPr>
+          <p:nvPr/>
+        </p:nvPicPr>
+        <p:blipFill rotWithShape="1">
+          <a:blip r:embed="rId2">
+            <a:extLst>
+              <a:ext uri="{BEBA8EAE-BF5A-486C-A8C5-ECC9F3942E4B}">
+                <a14:imgProps xmlns:a14="http://schemas.microsoft.com/office/drawing/2010/main">
+                  <a14:imgLayer r:embed="rId3">
+                    <a14:imgEffect>
+                      <a14:backgroundRemoval t="40000" b="60625" l="6406" r="96563">
+                        <a14:foregroundMark x1="24844" y1="42917" x2="36094" y2="40000"/>
+                        <a14:foregroundMark x1="36094" y1="40000" x2="53750" y2="42917"/>
+                        <a14:foregroundMark x1="53750" y1="42917" x2="59219" y2="41667"/>
+                        <a14:foregroundMark x1="59219" y1="41667" x2="77813" y2="43542"/>
+                        <a14:foregroundMark x1="77813" y1="43542" x2="84531" y2="42500"/>
+                        <a14:foregroundMark x1="84531" y1="42500" x2="88652" y2="40145"/>
+                        <a14:foregroundMark x1="91306" y1="39823" x2="95469" y2="41250"/>
+                        <a14:foregroundMark x1="95469" y1="41250" x2="95858" y2="41990"/>
+                        <a14:foregroundMark x1="23438" y1="45417" x2="6875" y2="49375"/>
+                        <a14:foregroundMark x1="6875" y1="49375" x2="6406" y2="56458"/>
+                        <a14:foregroundMark x1="6406" y1="56458" x2="17344" y2="58542"/>
+                        <a14:foregroundMark x1="17344" y1="58542" x2="23125" y2="58333"/>
+                        <a14:foregroundMark x1="23125" y1="58333" x2="23594" y2="58542"/>
+                        <a14:foregroundMark x1="23125" y1="49167" x2="17500" y2="50000"/>
+                        <a14:foregroundMark x1="17500" y1="50000" x2="12500" y2="53542"/>
+                        <a14:foregroundMark x1="12500" y1="53542" x2="18281" y2="53333"/>
+                        <a14:foregroundMark x1="18281" y1="53333" x2="23125" y2="56458"/>
+                        <a14:foregroundMark x1="23125" y1="56458" x2="23281" y2="56458"/>
+                        <a14:foregroundMark x1="11875" y1="45833" x2="6719" y2="45000"/>
+                        <a14:foregroundMark x1="6719" y1="45000" x2="11875" y2="47292"/>
+                        <a14:foregroundMark x1="11875" y1="47292" x2="11875" y2="47292"/>
+                        <a14:backgroundMark x1="89219" y1="38958" x2="91719" y2="38958"/>
+                        <a14:backgroundMark x1="98438" y1="43333" x2="98125" y2="57292"/>
+                        <a14:backgroundMark x1="98281" y1="42917" x2="98281" y2="55000"/>
+                        <a14:backgroundMark x1="98438" y1="43125" x2="97969" y2="48750"/>
+                      </a14:backgroundRemoval>
+                    </a14:imgEffect>
+                  </a14:imgLayer>
+                </a14:imgProps>
+              </a:ext>
+            </a:extLst>
+          </a:blip>
+          <a:srcRect t="37745" b="36372"/>
+          <a:stretch/>
+        </p:blipFill>
+        <p:spPr>
+          <a:xfrm>
+            <a:off x="205365" y="1685363"/>
+            <a:ext cx="11781270" cy="2286952"/>
+          </a:xfrm>
+          <a:prstGeom prst="rect">
+            <a:avLst/>
+          </a:prstGeom>
+        </p:spPr>
+      </p:pic>
+      <p:sp>
+        <p:nvSpPr>
+          <p:cNvPr id="6" name="אליפסה 5">
+            <a:extLst>
+              <a:ext uri="{FF2B5EF4-FFF2-40B4-BE49-F238E27FC236}">
+                <a16:creationId xmlns:a16="http://schemas.microsoft.com/office/drawing/2014/main" id="{50EB38AD-D8E9-45CF-B9EE-70812152B0B6}"/>
+              </a:ext>
+            </a:extLst>
+          </p:cNvPr>
+          <p:cNvSpPr/>
+          <p:nvPr/>
+        </p:nvSpPr>
+        <p:spPr>
+          <a:xfrm>
+            <a:off x="3747247" y="3263153"/>
+            <a:ext cx="1004048" cy="463208"/>
+          </a:xfrm>
+          <a:prstGeom prst="ellipse">
+            <a:avLst/>
+          </a:prstGeom>
+          <a:noFill/>
+          <a:ln>
+            <a:solidFill>
+              <a:schemeClr val="tx1"/>
+            </a:solidFill>
+          </a:ln>
+          <a:effectLst>
+            <a:glow rad="139700">
+              <a:schemeClr val="tx1">
+                <a:alpha val="40000"/>
+              </a:schemeClr>
+            </a:glow>
+          </a:effectLst>
+        </p:spPr>
+        <p:style>
+          <a:lnRef idx="2">
+            <a:schemeClr val="accent1">
+              <a:shade val="50000"/>
+            </a:schemeClr>
+          </a:lnRef>
+          <a:fillRef idx="1">
+            <a:schemeClr val="accent1"/>
+          </a:fillRef>
+          <a:effectRef idx="0">
+            <a:schemeClr val="accent1"/>
+          </a:effectRef>
+          <a:fontRef idx="minor">
+            <a:schemeClr val="lt1"/>
+          </a:fontRef>
+        </p:style>
+        <p:txBody>
+          <a:bodyPr rtlCol="1" anchor="ctr"/>
+          <a:lstStyle/>
+          <a:p>
+            <a:pPr algn="ctr"/>
+            <a:endParaRPr lang="he-IL" dirty="0"/>
           </a:p>
         </p:txBody>
       </p:sp>
       <p:sp>
         <p:nvSpPr>
-          <p:cNvPr id="3" name="מציין מיקום תוכן 2">
+          <p:cNvPr id="7" name="אליפסה 6">
             <a:extLst>
               <a:ext uri="{FF2B5EF4-FFF2-40B4-BE49-F238E27FC236}">
-                <a16:creationId xmlns:a16="http://schemas.microsoft.com/office/drawing/2014/main" id="{F6439C91-DD85-4227-B348-8B554E25D473}"/>
+                <a16:creationId xmlns:a16="http://schemas.microsoft.com/office/drawing/2014/main" id="{631FCB87-957C-41E4-9E85-E8E271C2BF74}"/>
               </a:ext>
             </a:extLst>
           </p:cNvPr>
-          <p:cNvSpPr>
-            <a:spLocks noGrp="1"/>
-          </p:cNvSpPr>
-          <p:nvPr>
-            <p:ph idx="1"/>
-          </p:nvPr>
+          <p:cNvSpPr/>
+          <p:nvPr/>
         </p:nvSpPr>
-        <p:spPr/>
+        <p:spPr>
+          <a:xfrm>
+            <a:off x="10766612" y="3287090"/>
+            <a:ext cx="1004048" cy="463208"/>
+          </a:xfrm>
+          <a:prstGeom prst="ellipse">
+            <a:avLst/>
+          </a:prstGeom>
+          <a:noFill/>
+          <a:ln>
+            <a:solidFill>
+              <a:schemeClr val="tx1"/>
+            </a:solidFill>
+          </a:ln>
+          <a:effectLst>
+            <a:glow rad="139700">
+              <a:schemeClr val="tx1">
+                <a:alpha val="40000"/>
+              </a:schemeClr>
+            </a:glow>
+          </a:effectLst>
+        </p:spPr>
+        <p:style>
+          <a:lnRef idx="2">
+            <a:schemeClr val="accent1">
+              <a:shade val="50000"/>
+            </a:schemeClr>
+          </a:lnRef>
+          <a:fillRef idx="1">
+            <a:schemeClr val="accent1"/>
+          </a:fillRef>
+          <a:effectRef idx="0">
+            <a:schemeClr val="accent1"/>
+          </a:effectRef>
+          <a:fontRef idx="minor">
+            <a:schemeClr val="lt1"/>
+          </a:fontRef>
+        </p:style>
         <p:txBody>
-          <a:bodyPr/>
+          <a:bodyPr rtlCol="1" anchor="ctr"/>
           <a:lstStyle/>
           <a:p>
-            <a:endParaRPr lang="he-IL"/>
+            <a:pPr algn="ctr"/>
+            <a:endParaRPr lang="he-IL" dirty="0"/>
           </a:p>
         </p:txBody>
       </p:sp>

</xml_diff>

<commit_message>
add more information to the power point
</commit_message>
<xml_diff>
--- a/CyberBullying.pptx
+++ b/CyberBullying.pptx
@@ -11143,10 +11143,10 @@
           <a:lstStyle/>
           <a:p>
             <a:r>
-              <a:rPr lang="en-US"/>
+              <a:rPr lang="en-US" dirty="0"/>
               <a:t>Summery</a:t>
             </a:r>
-            <a:endParaRPr lang="he-IL"/>
+            <a:endParaRPr lang="he-IL" dirty="0"/>
           </a:p>
         </p:txBody>
       </p:sp>

</xml_diff>

<commit_message>
add pdf and modified the pptx
</commit_message>
<xml_diff>
--- a/CyberBullying.pptx
+++ b/CyberBullying.pptx
@@ -4048,50 +4048,210 @@
           <a:p>
             <a:r>
               <a:rPr lang="he-IL" dirty="0"/>
-              <a:t>כאן אנחנו רואים את עקומת ה</a:t>
-            </a:r>
-            <a:r>
-              <a:rPr lang="en-US" dirty="0"/>
-              <a:t>ROC</a:t>
-            </a:r>
+              <a:t>כאן ניתן לראות את תוצאות המסווגים השונים אותם ניסינו עד כה על פי מספר מדדים.</a:t>
+            </a:r>
+          </a:p>
+          <a:p>
             <a:r>
               <a:rPr lang="he-IL" dirty="0"/>
-              <a:t> שמראה לנו את היחס שאנחנו יכולים לקבל בין </a:t>
-            </a:r>
-            <a:r>
-              <a:rPr lang="en-US" dirty="0"/>
-              <a:t>TPR</a:t>
-            </a:r>
-            <a:r>
-              <a:rPr lang="he-IL" dirty="0"/>
-              <a:t> ל</a:t>
-            </a:r>
-            <a:r>
-              <a:rPr lang="en-US" dirty="0"/>
-              <a:t>FPR</a:t>
-            </a:r>
-            <a:r>
-              <a:rPr lang="he-IL" dirty="0"/>
-              <a:t> עבור כל אחד מהמסווגים שבחנו, במקרה שלנו אנחנו מבינות שאנחנו רוצות לטעות כמה שפחות על הודעות אלימות אז נרצה לבחור נקודה שנמצאת במקום גבוה בעקומה ולכן גם פה </a:t>
-            </a:r>
-            <a:r>
-              <a:rPr lang="he-IL" dirty="0" err="1"/>
+              <a:t>כאשר החלטנו כי </a:t>
+            </a:r>
+            <a:r>
+              <a:rPr lang="he-IL" sz="1200" b="0" i="0" u="none" strike="noStrike" kern="1200" dirty="0">
+                <a:solidFill>
+                  <a:schemeClr val="tx1"/>
+                </a:solidFill>
+                <a:effectLst/>
+                <a:latin typeface="+mn-lt"/>
+                <a:ea typeface="+mn-ea"/>
+                <a:cs typeface="+mn-cs"/>
+              </a:rPr>
+              <a:t>עבורנו ה </a:t>
+            </a:r>
+            <a:r>
+              <a:rPr lang="en-US" sz="1200" b="0" i="0" u="none" strike="noStrike" kern="1200" dirty="0">
+                <a:solidFill>
+                  <a:schemeClr val="tx1"/>
+                </a:solidFill>
+                <a:effectLst/>
+                <a:latin typeface="+mn-lt"/>
+                <a:ea typeface="+mn-ea"/>
+                <a:cs typeface="+mn-cs"/>
+              </a:rPr>
+              <a:t> recall </a:t>
+            </a:r>
+            <a:r>
+              <a:rPr lang="he-IL" sz="1200" b="0" i="0" u="none" strike="noStrike" kern="1200" dirty="0">
+                <a:solidFill>
+                  <a:schemeClr val="tx1"/>
+                </a:solidFill>
+                <a:effectLst/>
+                <a:latin typeface="+mn-lt"/>
+                <a:ea typeface="+mn-ea"/>
+                <a:cs typeface="+mn-cs"/>
+              </a:rPr>
+              <a:t>יותר משמעותי, כיוון שטעות פחות חמורה עבורנו היא לסווג הודעה לא אלימה כאלימה.</a:t>
+            </a:r>
+          </a:p>
+          <a:p>
+            <a:r>
+              <a:rPr lang="he-IL" sz="1200" b="0" i="0" u="none" strike="noStrike" kern="1200" dirty="0">
+                <a:solidFill>
+                  <a:schemeClr val="tx1"/>
+                </a:solidFill>
+                <a:effectLst/>
+                <a:latin typeface="+mn-lt"/>
+                <a:ea typeface="+mn-ea"/>
+                <a:cs typeface="+mn-cs"/>
+              </a:rPr>
+              <a:t>לכן החלטנו לשים דגש על מדד ה</a:t>
+            </a:r>
+            <a:r>
+              <a:rPr lang="en-US" sz="1200" b="0" i="0" u="none" strike="noStrike" kern="1200" dirty="0">
+                <a:solidFill>
+                  <a:schemeClr val="tx1"/>
+                </a:solidFill>
+                <a:effectLst/>
+                <a:latin typeface="+mn-lt"/>
+                <a:ea typeface="+mn-ea"/>
+                <a:cs typeface="+mn-cs"/>
+              </a:rPr>
+              <a:t>F2</a:t>
+            </a:r>
+            <a:r>
+              <a:rPr lang="he-IL" sz="1200" b="0" i="0" u="none" strike="noStrike" kern="1200" dirty="0">
+                <a:solidFill>
+                  <a:schemeClr val="tx1"/>
+                </a:solidFill>
+                <a:effectLst/>
+                <a:latin typeface="+mn-lt"/>
+                <a:ea typeface="+mn-ea"/>
+                <a:cs typeface="+mn-cs"/>
+              </a:rPr>
+              <a:t> שבעצם נותן יותר משקל ל</a:t>
+            </a:r>
+            <a:r>
+              <a:rPr lang="en-US" sz="1200" b="0" i="0" u="none" strike="noStrike" kern="1200" dirty="0">
+                <a:solidFill>
+                  <a:schemeClr val="tx1"/>
+                </a:solidFill>
+                <a:effectLst/>
+                <a:latin typeface="+mn-lt"/>
+                <a:ea typeface="+mn-ea"/>
+                <a:cs typeface="+mn-cs"/>
+              </a:rPr>
+              <a:t>recall</a:t>
+            </a:r>
+            <a:r>
+              <a:rPr lang="he-IL" sz="1200" b="0" i="0" u="none" strike="noStrike" kern="1200" dirty="0">
+                <a:solidFill>
+                  <a:schemeClr val="tx1"/>
+                </a:solidFill>
+                <a:effectLst/>
+                <a:latin typeface="+mn-lt"/>
+                <a:ea typeface="+mn-ea"/>
+                <a:cs typeface="+mn-cs"/>
+              </a:rPr>
+              <a:t> מאשר ל</a:t>
+            </a:r>
+            <a:r>
+              <a:rPr lang="en-US" sz="1200" b="0" i="0" u="none" strike="noStrike" kern="1200" dirty="0" err="1">
+                <a:solidFill>
+                  <a:schemeClr val="tx1"/>
+                </a:solidFill>
+                <a:effectLst/>
+                <a:latin typeface="+mn-lt"/>
+                <a:ea typeface="+mn-ea"/>
+                <a:cs typeface="+mn-cs"/>
+              </a:rPr>
+              <a:t>presicion</a:t>
+            </a:r>
+            <a:r>
+              <a:rPr lang="en-US" sz="1200" b="0" i="0" u="none" strike="noStrike" kern="1200" dirty="0">
+                <a:solidFill>
+                  <a:schemeClr val="tx1"/>
+                </a:solidFill>
+                <a:effectLst/>
+                <a:latin typeface="+mn-lt"/>
+                <a:ea typeface="+mn-ea"/>
+                <a:cs typeface="+mn-cs"/>
+              </a:rPr>
+              <a:t> </a:t>
+            </a:r>
+            <a:r>
+              <a:rPr lang="he-IL" sz="1200" b="0" i="0" u="none" strike="noStrike" kern="1200" dirty="0">
+                <a:solidFill>
+                  <a:schemeClr val="tx1"/>
+                </a:solidFill>
+                <a:effectLst/>
+                <a:latin typeface="+mn-lt"/>
+                <a:ea typeface="+mn-ea"/>
+                <a:cs typeface="+mn-cs"/>
+              </a:rPr>
+              <a:t> כפי שרצינו.</a:t>
+            </a:r>
+          </a:p>
+          <a:p>
+            <a:r>
+              <a:rPr lang="he-IL" sz="1200" b="0" i="0" u="none" strike="noStrike" kern="1200" dirty="0">
+                <a:solidFill>
+                  <a:schemeClr val="tx1"/>
+                </a:solidFill>
+                <a:effectLst/>
+                <a:latin typeface="+mn-lt"/>
+                <a:ea typeface="+mn-ea"/>
+                <a:cs typeface="+mn-cs"/>
+              </a:rPr>
+              <a:t>מהתוצאות האלו ניתן לראות כי עד כה </a:t>
+            </a:r>
+            <a:r>
+              <a:rPr lang="he-IL" sz="1200" b="0" i="0" u="none" strike="noStrike" kern="1200" dirty="0" err="1">
+                <a:solidFill>
+                  <a:schemeClr val="tx1"/>
+                </a:solidFill>
+                <a:effectLst/>
+                <a:latin typeface="+mn-lt"/>
+                <a:ea typeface="+mn-ea"/>
+                <a:cs typeface="+mn-cs"/>
+              </a:rPr>
               <a:t>הרנדום</a:t>
             </a:r>
             <a:r>
-              <a:rPr lang="he-IL" dirty="0"/>
+              <a:rPr lang="he-IL" sz="1200" b="0" i="0" u="none" strike="noStrike" kern="1200" dirty="0">
+                <a:solidFill>
+                  <a:schemeClr val="tx1"/>
+                </a:solidFill>
+                <a:effectLst/>
+                <a:latin typeface="+mn-lt"/>
+                <a:ea typeface="+mn-ea"/>
+                <a:cs typeface="+mn-cs"/>
+              </a:rPr>
               <a:t> </a:t>
             </a:r>
             <a:r>
-              <a:rPr lang="he-IL" dirty="0" err="1"/>
+              <a:rPr lang="he-IL" sz="1200" b="0" i="0" u="none" strike="noStrike" kern="1200" dirty="0" err="1">
+                <a:solidFill>
+                  <a:schemeClr val="tx1"/>
+                </a:solidFill>
+                <a:effectLst/>
+                <a:latin typeface="+mn-lt"/>
+                <a:ea typeface="+mn-ea"/>
+                <a:cs typeface="+mn-cs"/>
+              </a:rPr>
               <a:t>פורסט</a:t>
             </a:r>
             <a:r>
-              <a:rPr lang="he-IL" dirty="0"/>
-              <a:t> מהווה את המסווג הטוב ביותר עבורנו.</a:t>
-            </a:r>
-          </a:p>
-          <a:p>
+              <a:rPr lang="he-IL" sz="1200" b="0" i="0" u="none" strike="noStrike" kern="1200" dirty="0">
+                <a:solidFill>
+                  <a:schemeClr val="tx1"/>
+                </a:solidFill>
+                <a:effectLst/>
+                <a:latin typeface="+mn-lt"/>
+                <a:ea typeface="+mn-ea"/>
+                <a:cs typeface="+mn-cs"/>
+              </a:rPr>
+              <a:t> סיווג את ההודעות בצורה הטובה ביותר.</a:t>
+            </a:r>
             <a:endParaRPr lang="he-IL" dirty="0"/>
           </a:p>
         </p:txBody>
@@ -4113,7 +4273,7 @@
           <a:p>
             <a:fld id="{476A9585-3896-4CC5-B07B-12C1E5AFAA07}" type="slidenum">
               <a:rPr lang="he-IL" smtClean="0"/>
-              <a:t>11</a:t>
+              <a:t>10</a:t>
             </a:fld>
             <a:endParaRPr lang="he-IL"/>
           </a:p>
@@ -4122,7 +4282,7 @@
     </p:spTree>
     <p:extLst>
       <p:ext uri="{BB962C8B-B14F-4D97-AF65-F5344CB8AC3E}">
-        <p14:creationId xmlns:p14="http://schemas.microsoft.com/office/powerpoint/2010/main" val="2310891190"/>
+        <p14:creationId xmlns:p14="http://schemas.microsoft.com/office/powerpoint/2010/main" val="649913656"/>
       </p:ext>
     </p:extLst>
   </p:cSld>
@@ -4178,38 +4338,51 @@
           <a:p>
             <a:r>
               <a:rPr lang="he-IL" dirty="0"/>
-              <a:t>כאן ניתן לראות תוצאות ראשוניות של ניסיון חלוקה ל3 </a:t>
+              <a:t>כאן אנחנו רואים את עקומת ה</a:t>
+            </a:r>
+            <a:r>
+              <a:rPr lang="en-US" dirty="0"/>
+              <a:t>ROC</a:t>
+            </a:r>
+            <a:r>
+              <a:rPr lang="he-IL" dirty="0"/>
+              <a:t> שמראה לנו את היחס שאנחנו יכולים לקבל בין </a:t>
+            </a:r>
+            <a:r>
+              <a:rPr lang="en-US" dirty="0"/>
+              <a:t>TPR</a:t>
+            </a:r>
+            <a:r>
+              <a:rPr lang="he-IL" dirty="0"/>
+              <a:t> ל</a:t>
+            </a:r>
+            <a:r>
+              <a:rPr lang="en-US" dirty="0"/>
+              <a:t>FPR</a:t>
+            </a:r>
+            <a:r>
+              <a:rPr lang="he-IL" dirty="0"/>
+              <a:t> עבור כל אחד מהמסווגים שבחנו, במקרה שלנו אנחנו מבינות שאנחנו רוצות לטעות כמה שפחות על הודעות אלימות אז נרצה לבחור נקודה שנמצאת במקום גבוה בעקומה ולכן גם פה </a:t>
             </a:r>
             <a:r>
               <a:rPr lang="he-IL" dirty="0" err="1"/>
-              <a:t>קלאסטרים</a:t>
+              <a:t>הרנדום</a:t>
             </a:r>
             <a:r>
               <a:rPr lang="he-IL" dirty="0"/>
-              <a:t>. שבראייתנו ניתן למצוא בין המילים המובילות שלהם (שמוצגות בגדול יותר) מכנה משותף.</a:t>
-            </a:r>
-          </a:p>
-          <a:p>
+              <a:t> </a:t>
+            </a:r>
+            <a:r>
+              <a:rPr lang="he-IL" dirty="0" err="1"/>
+              <a:t>פורסט</a:t>
+            </a:r>
             <a:r>
               <a:rPr lang="he-IL" dirty="0"/>
-              <a:t>על כן חלקנו את </a:t>
-            </a:r>
-            <a:r>
-              <a:rPr lang="he-IL" dirty="0" err="1"/>
-              <a:t>הקלאסטרים</a:t>
-            </a:r>
-            <a:r>
-              <a:rPr lang="he-IL" dirty="0"/>
-              <a:t> לשלושה נושאים – הערות מיניות (שנראה לי שתוכלו לקרוא את המילים לבד), איומים (מילים כמו – התאבד, מת, חרם, בכה, שנא) וכינויי גנאי (מילים כמו סתום, </a:t>
-            </a:r>
-            <a:r>
-              <a:rPr lang="he-IL" dirty="0" err="1"/>
-              <a:t>דבע</a:t>
-            </a:r>
-            <a:r>
-              <a:rPr lang="he-IL" dirty="0"/>
-              <a:t>, מטומטם, טיפש, הומו)</a:t>
-            </a:r>
+              <a:t> מהווה את המסווג הטוב ביותר עבורנו.</a:t>
+            </a:r>
+          </a:p>
+          <a:p>
+            <a:endParaRPr lang="he-IL" dirty="0"/>
           </a:p>
         </p:txBody>
       </p:sp>
@@ -4230,7 +4403,7 @@
           <a:p>
             <a:fld id="{476A9585-3896-4CC5-B07B-12C1E5AFAA07}" type="slidenum">
               <a:rPr lang="he-IL" smtClean="0"/>
-              <a:t>12</a:t>
+              <a:t>11</a:t>
             </a:fld>
             <a:endParaRPr lang="he-IL"/>
           </a:p>
@@ -4239,7 +4412,7 @@
     </p:spTree>
     <p:extLst>
       <p:ext uri="{BB962C8B-B14F-4D97-AF65-F5344CB8AC3E}">
-        <p14:creationId xmlns:p14="http://schemas.microsoft.com/office/powerpoint/2010/main" val="344801608"/>
+        <p14:creationId xmlns:p14="http://schemas.microsoft.com/office/powerpoint/2010/main" val="2310891190"/>
       </p:ext>
     </p:extLst>
   </p:cSld>
@@ -4295,48 +4468,37 @@
           <a:p>
             <a:r>
               <a:rPr lang="he-IL" dirty="0"/>
-              <a:t>הדברים שהלכו כמצופה היו-</a:t>
-            </a:r>
-          </a:p>
-          <a:p>
+              <a:t>כאן ניתן לראות תוצאות ראשוניות של ניסיון חלוקה ל3 </a:t>
+            </a:r>
+            <a:r>
+              <a:rPr lang="he-IL" dirty="0" err="1"/>
+              <a:t>קלאסטרים</a:t>
+            </a:r>
             <a:r>
               <a:rPr lang="he-IL" dirty="0"/>
-              <a:t>השלב של הטקסט </a:t>
+              <a:t>. שבראייתנו ניתן למצוא בין המילים המובילות שלהם (שמוצגות בגדול יותר) מכנה משותף.</a:t>
+            </a:r>
+          </a:p>
+          <a:p>
+            <a:r>
+              <a:rPr lang="he-IL" dirty="0"/>
+              <a:t>על כן חלקנו את </a:t>
             </a:r>
             <a:r>
               <a:rPr lang="he-IL" dirty="0" err="1"/>
-              <a:t>נורמליזיישן</a:t>
+              <a:t>הקלאסטרים</a:t>
             </a:r>
             <a:r>
               <a:rPr lang="he-IL" dirty="0"/>
-              <a:t> שיפר את התוצאות. ניתן לראות את זה בגרף הזה כאשר העמודות הכתומות מציגות תוצאות סיווג של </a:t>
+              <a:t> לשלושה נושאים – הערות מיניות (שנראה לי שתוכלו לקרוא את המילים לבד), איומים (מילים כמו – התאבד, מת, חרם, בכה, שנא) וכינויי גנאי (מילים כמו סתום, </a:t>
             </a:r>
             <a:r>
               <a:rPr lang="he-IL" dirty="0" err="1"/>
-              <a:t>רנדום</a:t>
+              <a:t>דבע</a:t>
             </a:r>
             <a:r>
               <a:rPr lang="he-IL" dirty="0"/>
-              <a:t> </a:t>
-            </a:r>
-            <a:r>
-              <a:rPr lang="he-IL" dirty="0" err="1"/>
-              <a:t>פורסט</a:t>
-            </a:r>
-            <a:r>
-              <a:rPr lang="he-IL" dirty="0"/>
-              <a:t> על הטקסט המקורי והעמודות הכחולות מציגות את התוצאות עם שלב ה</a:t>
-            </a:r>
-            <a:r>
-              <a:rPr lang="en-US" dirty="0"/>
-              <a:t>text normalization</a:t>
-            </a:r>
-            <a:endParaRPr lang="he-IL" dirty="0"/>
-          </a:p>
-          <a:p>
-            <a:r>
-              <a:rPr lang="he-IL" dirty="0"/>
-              <a:t>וכן ככל שהמסווג היה טוב ומורכב יותר כך התוצאות שלו היו טובות יותר.</a:t>
+              <a:t>, מטומטם, טיפש, הומו)</a:t>
             </a:r>
           </a:p>
         </p:txBody>
@@ -4358,7 +4520,7 @@
           <a:p>
             <a:fld id="{476A9585-3896-4CC5-B07B-12C1E5AFAA07}" type="slidenum">
               <a:rPr lang="he-IL" smtClean="0"/>
-              <a:t>13</a:t>
+              <a:t>12</a:t>
             </a:fld>
             <a:endParaRPr lang="he-IL"/>
           </a:p>
@@ -4367,7 +4529,7 @@
     </p:spTree>
     <p:extLst>
       <p:ext uri="{BB962C8B-B14F-4D97-AF65-F5344CB8AC3E}">
-        <p14:creationId xmlns:p14="http://schemas.microsoft.com/office/powerpoint/2010/main" val="4213681389"/>
+        <p14:creationId xmlns:p14="http://schemas.microsoft.com/office/powerpoint/2010/main" val="344801608"/>
       </p:ext>
     </p:extLst>
   </p:cSld>
@@ -4423,20 +4585,37 @@
           <a:p>
             <a:r>
               <a:rPr lang="he-IL" dirty="0"/>
-              <a:t>דברים שהפתיעו אותנו –</a:t>
-            </a:r>
-          </a:p>
-          <a:p>
-            <a:pPr marL="228600" indent="-228600">
-              <a:buAutoNum type="arabicPeriod"/>
-            </a:pPr>
+              <a:t>הדברים שהלכו כמצופה היו-</a:t>
+            </a:r>
+          </a:p>
+          <a:p>
+            <a:r>
+              <a:rPr lang="he-IL" dirty="0"/>
+              <a:t>השלב של הטקסט </a:t>
+            </a:r>
             <a:r>
               <a:rPr lang="he-IL" dirty="0" err="1"/>
-              <a:t>הדאטה</a:t>
+              <a:t>נורמליזיישן</a:t>
             </a:r>
             <a:r>
               <a:rPr lang="he-IL" dirty="0"/>
-              <a:t> היה עמוס מאוד בסלנג, שגיאות כתיב, ריבוי אותיות, חיבור מילים -  מה שהפך למורכב עוד יותר את השלב של ה</a:t>
+              <a:t> שיפר את התוצאות. ניתן לראות את זה בגרף הזה כאשר העמודות הכתומות מציגות תוצאות סיווג של </a:t>
+            </a:r>
+            <a:r>
+              <a:rPr lang="he-IL" dirty="0" err="1"/>
+              <a:t>רנדום</a:t>
+            </a:r>
+            <a:r>
+              <a:rPr lang="he-IL" dirty="0"/>
+              <a:t> </a:t>
+            </a:r>
+            <a:r>
+              <a:rPr lang="he-IL" dirty="0" err="1"/>
+              <a:t>פורסט</a:t>
+            </a:r>
+            <a:r>
+              <a:rPr lang="he-IL" dirty="0"/>
+              <a:t> על הטקסט המקורי והעמודות הכחולות מציגות את התוצאות עם שלב ה</a:t>
             </a:r>
             <a:r>
               <a:rPr lang="en-US" dirty="0"/>
@@ -4445,58 +4624,10 @@
             <a:endParaRPr lang="he-IL" dirty="0"/>
           </a:p>
           <a:p>
-            <a:pPr marL="228600" indent="-228600">
-              <a:buAutoNum type="arabicPeriod"/>
-            </a:pPr>
             <a:r>
               <a:rPr lang="he-IL" dirty="0"/>
-              <a:t>טעויות של </a:t>
-            </a:r>
-            <a:r>
-              <a:rPr lang="he-IL" dirty="0" err="1"/>
-              <a:t>היאפ</a:t>
-            </a:r>
-            <a:r>
-              <a:rPr lang="he-IL" dirty="0"/>
-              <a:t> על מילים חשובות עבורנו לתיוג כמו למשל המורפמה דל המילה "מכות" הפכה ל"מך" (מלשון עני)</a:t>
-            </a:r>
-          </a:p>
-          <a:p>
-            <a:pPr marL="228600" indent="-228600">
-              <a:buAutoNum type="arabicPeriod"/>
-            </a:pPr>
-            <a:r>
-              <a:rPr lang="he-IL" dirty="0"/>
-              <a:t>התוצאות של </a:t>
-            </a:r>
-            <a:r>
-              <a:rPr lang="he-IL" dirty="0" err="1"/>
-              <a:t>הקלאסטרינג</a:t>
-            </a:r>
-            <a:r>
-              <a:rPr lang="he-IL" dirty="0"/>
-              <a:t> לא היו מספיק טובות עבור הצרכים שלנו. אך אנחנו מצפות שהכנסת שלב </a:t>
-            </a:r>
-            <a:r>
-              <a:rPr lang="he-IL" dirty="0" err="1"/>
-              <a:t>הפיטצ'רים</a:t>
-            </a:r>
-            <a:r>
-              <a:rPr lang="he-IL" dirty="0"/>
-              <a:t> ישפר את הביצועים.</a:t>
-            </a:r>
-          </a:p>
-          <a:p>
-            <a:pPr marL="228600" indent="-228600">
-              <a:buAutoNum type="arabicPeriod"/>
-            </a:pPr>
-            <a:endParaRPr lang="he-IL" dirty="0"/>
-          </a:p>
-          <a:p>
-            <a:pPr marL="228600" indent="-228600">
-              <a:buAutoNum type="arabicPeriod"/>
-            </a:pPr>
-            <a:endParaRPr lang="he-IL" dirty="0"/>
+              <a:t>וכן ככל שהמסווג היה טוב ומורכב יותר כך התוצאות שלו היו טובות יותר.</a:t>
+            </a:r>
           </a:p>
         </p:txBody>
       </p:sp>
@@ -4517,7 +4648,7 @@
           <a:p>
             <a:fld id="{476A9585-3896-4CC5-B07B-12C1E5AFAA07}" type="slidenum">
               <a:rPr lang="he-IL" smtClean="0"/>
-              <a:t>14</a:t>
+              <a:t>13</a:t>
             </a:fld>
             <a:endParaRPr lang="he-IL"/>
           </a:p>
@@ -4526,7 +4657,7 @@
     </p:spTree>
     <p:extLst>
       <p:ext uri="{BB962C8B-B14F-4D97-AF65-F5344CB8AC3E}">
-        <p14:creationId xmlns:p14="http://schemas.microsoft.com/office/powerpoint/2010/main" val="105649337"/>
+        <p14:creationId xmlns:p14="http://schemas.microsoft.com/office/powerpoint/2010/main" val="4213681389"/>
       </p:ext>
     </p:extLst>
   </p:cSld>
@@ -4582,7 +4713,7 @@
           <a:p>
             <a:r>
               <a:rPr lang="he-IL" dirty="0"/>
-              <a:t>לסיכום-</a:t>
+              <a:t>דברים שהפתיעו אותנו –</a:t>
             </a:r>
           </a:p>
           <a:p>
@@ -4590,9 +4721,18 @@
               <a:buAutoNum type="arabicPeriod"/>
             </a:pPr>
             <a:r>
+              <a:rPr lang="he-IL" dirty="0" err="1"/>
+              <a:t>הדאטה</a:t>
+            </a:r>
+            <a:r>
               <a:rPr lang="he-IL" dirty="0"/>
-              <a:t>הצלחנו לסווג את ההודעות לאלימות ולא אלימות בצורה טובה</a:t>
-            </a:r>
+              <a:t> היה עמוס מאוד בסלנג, שגיאות כתיב, ריבוי אותיות, חיבור מילים -  מה שהפך למורכב עוד יותר את השלב של ה</a:t>
+            </a:r>
+            <a:r>
+              <a:rPr lang="en-US" dirty="0"/>
+              <a:t>text normalization</a:t>
+            </a:r>
+            <a:endParaRPr lang="he-IL" dirty="0"/>
           </a:p>
           <a:p>
             <a:pPr marL="228600" indent="-228600">
@@ -4600,7 +4740,15 @@
             </a:pPr>
             <a:r>
               <a:rPr lang="he-IL" dirty="0"/>
-              <a:t>הצלחנו באופן חלקי לענות על שאלת המחקר השנייה שלנו – מהם הסיבות לאלימות ברשת</a:t>
+              <a:t>טעויות של </a:t>
+            </a:r>
+            <a:r>
+              <a:rPr lang="he-IL" dirty="0" err="1"/>
+              <a:t>היאפ</a:t>
+            </a:r>
+            <a:r>
+              <a:rPr lang="he-IL" dirty="0"/>
+              <a:t> על מילים חשובות עבורנו לתיוג כמו למשל המורפמה דל המילה "מכות" הפכה ל"מך" (מלשון עני)</a:t>
             </a:r>
           </a:p>
           <a:p>
@@ -4609,7 +4757,7 @@
             </a:pPr>
             <a:r>
               <a:rPr lang="he-IL" dirty="0"/>
-              <a:t>אנחנו צריכות להמשיך ולשפר את המסווגים שלנו , אולי ע"י למידה עמוקה. וכן את </a:t>
+              <a:t>התוצאות של </a:t>
             </a:r>
             <a:r>
               <a:rPr lang="he-IL" dirty="0" err="1"/>
@@ -4617,24 +4765,28 @@
             </a:r>
             <a:r>
               <a:rPr lang="he-IL" dirty="0"/>
-              <a:t>. השלב הראשון בשיפור יהיה הוספת שלב </a:t>
+              <a:t> לא היו מספיק טובות עבור הצרכים שלנו. אך אנחנו מצפות שהכנסת שלב </a:t>
             </a:r>
             <a:r>
               <a:rPr lang="he-IL" dirty="0" err="1"/>
-              <a:t>הפיטצר</a:t>
+              <a:t>הפיטצ'רים</a:t>
             </a:r>
             <a:r>
               <a:rPr lang="he-IL" dirty="0"/>
-              <a:t> </a:t>
-            </a:r>
-            <a:r>
-              <a:rPr lang="he-IL" dirty="0" err="1"/>
-              <a:t>סלקשיין</a:t>
-            </a:r>
-            <a:r>
-              <a:rPr lang="he-IL" dirty="0"/>
-              <a:t>.</a:t>
-            </a:r>
+              <a:t> ישפר את הביצועים.</a:t>
+            </a:r>
+          </a:p>
+          <a:p>
+            <a:pPr marL="228600" indent="-228600">
+              <a:buAutoNum type="arabicPeriod"/>
+            </a:pPr>
+            <a:endParaRPr lang="he-IL" dirty="0"/>
+          </a:p>
+          <a:p>
+            <a:pPr marL="228600" indent="-228600">
+              <a:buAutoNum type="arabicPeriod"/>
+            </a:pPr>
+            <a:endParaRPr lang="he-IL" dirty="0"/>
           </a:p>
         </p:txBody>
       </p:sp>
@@ -4655,6 +4807,144 @@
           <a:p>
             <a:fld id="{476A9585-3896-4CC5-B07B-12C1E5AFAA07}" type="slidenum">
               <a:rPr lang="he-IL" smtClean="0"/>
+              <a:t>14</a:t>
+            </a:fld>
+            <a:endParaRPr lang="he-IL"/>
+          </a:p>
+        </p:txBody>
+      </p:sp>
+    </p:spTree>
+    <p:extLst>
+      <p:ext uri="{BB962C8B-B14F-4D97-AF65-F5344CB8AC3E}">
+        <p14:creationId xmlns:p14="http://schemas.microsoft.com/office/powerpoint/2010/main" val="105649337"/>
+      </p:ext>
+    </p:extLst>
+  </p:cSld>
+  <p:clrMapOvr>
+    <a:masterClrMapping/>
+  </p:clrMapOvr>
+</p:notes>
+</file>
+
+<file path=ppt/notesSlides/notesSlide15.xml><?xml version="1.0" encoding="utf-8"?>
+<p:notes xmlns:a="http://schemas.openxmlformats.org/drawingml/2006/main" xmlns:r="http://schemas.openxmlformats.org/officeDocument/2006/relationships" xmlns:p="http://schemas.openxmlformats.org/presentationml/2006/main">
+  <p:cSld>
+    <p:spTree>
+      <p:nvGrpSpPr>
+        <p:cNvPr id="1" name=""/>
+        <p:cNvGrpSpPr/>
+        <p:nvPr/>
+      </p:nvGrpSpPr>
+      <p:grpSpPr>
+        <a:xfrm>
+          <a:off x="0" y="0"/>
+          <a:ext cx="0" cy="0"/>
+          <a:chOff x="0" y="0"/>
+          <a:chExt cx="0" cy="0"/>
+        </a:xfrm>
+      </p:grpSpPr>
+      <p:sp>
+        <p:nvSpPr>
+          <p:cNvPr id="2" name="מציין מיקום של תמונת שקופית 1"/>
+          <p:cNvSpPr>
+            <a:spLocks noGrp="1" noRot="1" noChangeAspect="1"/>
+          </p:cNvSpPr>
+          <p:nvPr>
+            <p:ph type="sldImg"/>
+          </p:nvPr>
+        </p:nvSpPr>
+        <p:spPr/>
+      </p:sp>
+      <p:sp>
+        <p:nvSpPr>
+          <p:cNvPr id="3" name="מציין מיקום של הערות 2"/>
+          <p:cNvSpPr>
+            <a:spLocks noGrp="1"/>
+          </p:cNvSpPr>
+          <p:nvPr>
+            <p:ph type="body" idx="1"/>
+          </p:nvPr>
+        </p:nvSpPr>
+        <p:spPr/>
+        <p:txBody>
+          <a:bodyPr/>
+          <a:lstStyle/>
+          <a:p>
+            <a:r>
+              <a:rPr lang="he-IL" dirty="0"/>
+              <a:t>לסיכום-</a:t>
+            </a:r>
+          </a:p>
+          <a:p>
+            <a:pPr marL="228600" indent="-228600">
+              <a:buAutoNum type="arabicPeriod"/>
+            </a:pPr>
+            <a:r>
+              <a:rPr lang="he-IL" dirty="0"/>
+              <a:t>הצלחנו לסווג את ההודעות לאלימות ולא אלימות בצורה טובה</a:t>
+            </a:r>
+          </a:p>
+          <a:p>
+            <a:pPr marL="228600" indent="-228600">
+              <a:buAutoNum type="arabicPeriod"/>
+            </a:pPr>
+            <a:r>
+              <a:rPr lang="he-IL" dirty="0"/>
+              <a:t>הצלחנו באופן חלקי לענות על שאלת המחקר השנייה שלנו – מהם סוגי האלימות ברשת</a:t>
+            </a:r>
+          </a:p>
+          <a:p>
+            <a:pPr marL="228600" indent="-228600">
+              <a:buAutoNum type="arabicPeriod"/>
+            </a:pPr>
+            <a:r>
+              <a:rPr lang="he-IL" dirty="0"/>
+              <a:t>אנחנו צריכות להמשיך ולשפר את המסווגים שלנו , אולי ע"י למידה עמוקה. וכן את </a:t>
+            </a:r>
+            <a:r>
+              <a:rPr lang="he-IL" dirty="0" err="1"/>
+              <a:t>הקלאסטרינג</a:t>
+            </a:r>
+            <a:r>
+              <a:rPr lang="he-IL" dirty="0"/>
+              <a:t>. השלב הראשון בשיפור יהיה הוספת שלב </a:t>
+            </a:r>
+            <a:r>
+              <a:rPr lang="he-IL" dirty="0" err="1"/>
+              <a:t>הפיטצר</a:t>
+            </a:r>
+            <a:r>
+              <a:rPr lang="he-IL" dirty="0"/>
+              <a:t> </a:t>
+            </a:r>
+            <a:r>
+              <a:rPr lang="he-IL" dirty="0" err="1"/>
+              <a:t>סלקשיין</a:t>
+            </a:r>
+            <a:r>
+              <a:rPr lang="he-IL" dirty="0"/>
+              <a:t>.</a:t>
+            </a:r>
+          </a:p>
+        </p:txBody>
+      </p:sp>
+      <p:sp>
+        <p:nvSpPr>
+          <p:cNvPr id="4" name="מציין מיקום של מספר שקופית 3"/>
+          <p:cNvSpPr>
+            <a:spLocks noGrp="1"/>
+          </p:cNvSpPr>
+          <p:nvPr>
+            <p:ph type="sldNum" sz="quarter" idx="5"/>
+          </p:nvPr>
+        </p:nvSpPr>
+        <p:spPr/>
+        <p:txBody>
+          <a:bodyPr/>
+          <a:lstStyle/>
+          <a:p>
+            <a:fld id="{476A9585-3896-4CC5-B07B-12C1E5AFAA07}" type="slidenum">
+              <a:rPr lang="he-IL" smtClean="0"/>
               <a:t>15</a:t>
             </a:fld>
             <a:endParaRPr lang="he-IL"/>
@@ -4674,7 +4964,7 @@
 </p:notes>
 </file>
 
-<file path=ppt/notesSlides/notesSlide15.xml><?xml version="1.0" encoding="utf-8"?>
+<file path=ppt/notesSlides/notesSlide16.xml><?xml version="1.0" encoding="utf-8"?>
 <p:notes xmlns:a="http://schemas.openxmlformats.org/drawingml/2006/main" xmlns:r="http://schemas.openxmlformats.org/officeDocument/2006/relationships" xmlns:p="http://schemas.openxmlformats.org/presentationml/2006/main">
   <p:cSld>
     <p:spTree>
@@ -4850,131 +5140,9 @@
           <a:lstStyle/>
           <a:p>
             <a:r>
-              <a:rPr lang="he-IL" sz="1200" b="0" i="0" kern="1200" dirty="0">
-                <a:solidFill>
-                  <a:schemeClr val="tx1"/>
-                </a:solidFill>
-                <a:effectLst/>
-                <a:latin typeface="+mn-lt"/>
-                <a:ea typeface="+mn-ea"/>
-                <a:cs typeface="+mn-cs"/>
-              </a:rPr>
-              <a:t>אז נתחיל </a:t>
-            </a:r>
-            <a:r>
-              <a:rPr lang="he-IL" sz="1200" b="0" i="0" kern="1200" dirty="0" err="1">
-                <a:solidFill>
-                  <a:schemeClr val="tx1"/>
-                </a:solidFill>
-                <a:effectLst/>
-                <a:latin typeface="+mn-lt"/>
-                <a:ea typeface="+mn-ea"/>
-                <a:cs typeface="+mn-cs"/>
-              </a:rPr>
-              <a:t>בקצת</a:t>
-            </a:r>
-            <a:r>
-              <a:rPr lang="he-IL" sz="1200" b="0" i="0" kern="1200" dirty="0">
-                <a:solidFill>
-                  <a:schemeClr val="tx1"/>
-                </a:solidFill>
-                <a:effectLst/>
-                <a:latin typeface="+mn-lt"/>
-                <a:ea typeface="+mn-ea"/>
-                <a:cs typeface="+mn-cs"/>
-              </a:rPr>
-              <a:t> רקע ומוטיבציה.. </a:t>
-            </a:r>
-          </a:p>
-          <a:p>
-            <a:r>
-              <a:rPr lang="he-IL" sz="1200" b="0" i="0" kern="1200" dirty="0">
-                <a:solidFill>
-                  <a:schemeClr val="tx1"/>
-                </a:solidFill>
-                <a:effectLst/>
-                <a:latin typeface="+mn-lt"/>
-                <a:ea typeface="+mn-ea"/>
-                <a:cs typeface="+mn-cs"/>
-              </a:rPr>
-              <a:t>האינטרנט יכול להיות מקום פורה ומעצים לילדים, אך בו בזמן גם בעל סכנות רבות אשר יכולות להשפיע על התפתחותם.</a:t>
-            </a:r>
-            <a:endParaRPr lang="en-US" sz="1200" b="0" i="0" kern="1200" dirty="0">
-              <a:solidFill>
-                <a:schemeClr val="tx1"/>
-              </a:solidFill>
-              <a:effectLst/>
-              <a:latin typeface="+mn-lt"/>
-              <a:ea typeface="+mn-ea"/>
-              <a:cs typeface="+mn-cs"/>
-            </a:endParaRPr>
-          </a:p>
-          <a:p>
-            <a:r>
-              <a:rPr lang="he-IL" sz="1200" b="0" i="0" kern="1200" dirty="0">
-                <a:solidFill>
-                  <a:schemeClr val="tx1"/>
-                </a:solidFill>
-                <a:effectLst/>
-                <a:latin typeface="+mn-lt"/>
-                <a:ea typeface="+mn-ea"/>
-                <a:cs typeface="+mn-cs"/>
-              </a:rPr>
-              <a:t>אז</a:t>
-            </a:r>
-            <a:r>
-              <a:rPr lang="he-IL" sz="1200" b="0" i="0" kern="1200" baseline="0" dirty="0">
-                <a:solidFill>
-                  <a:schemeClr val="tx1"/>
-                </a:solidFill>
-                <a:effectLst/>
-                <a:latin typeface="+mn-lt"/>
-                <a:ea typeface="+mn-ea"/>
-                <a:cs typeface="+mn-cs"/>
-              </a:rPr>
-              <a:t> מה זה בריונות ברשת? </a:t>
-            </a:r>
-            <a:r>
-              <a:rPr lang="he-IL" sz="1200" b="0" i="0" kern="1200" dirty="0">
-                <a:solidFill>
-                  <a:schemeClr val="tx1"/>
-                </a:solidFill>
-                <a:effectLst/>
-                <a:latin typeface="+mn-lt"/>
-                <a:ea typeface="+mn-ea"/>
-                <a:cs typeface="+mn-cs"/>
-              </a:rPr>
-              <a:t> בריונות ברשת היא תופעה חדשה יחסית בה נעשה שימוש באינטרנט על מנת להשמיץ, להטריד, להביך, להפחיד, או לתקוף אדם יחיד או קבוצה. היא</a:t>
-            </a:r>
-            <a:r>
-              <a:rPr lang="he-IL" sz="1200" b="0" i="0" kern="1200" baseline="0" dirty="0">
-                <a:solidFill>
-                  <a:schemeClr val="tx1"/>
-                </a:solidFill>
-                <a:effectLst/>
-                <a:latin typeface="+mn-lt"/>
-                <a:ea typeface="+mn-ea"/>
-                <a:cs typeface="+mn-cs"/>
-              </a:rPr>
-              <a:t> באה לידי ביטוי ב</a:t>
-            </a:r>
-            <a:r>
               <a:rPr lang="he-IL" dirty="0"/>
-              <a:t>פרסום שמועות, איומים, הערות מיניות, מידע אישי של הקורבן</a:t>
-            </a:r>
-            <a:r>
-              <a:rPr lang="he-IL" baseline="0" dirty="0"/>
-              <a:t> ועוד. </a:t>
-            </a:r>
-          </a:p>
-          <a:p>
-            <a:r>
-              <a:rPr lang="he-IL" baseline="0" dirty="0"/>
-              <a:t>בריונות ברשת נפוצה מאוד בימנו, ובעיקר בקרב בני נוער. </a:t>
-            </a:r>
-          </a:p>
-          <a:p>
-            <a:endParaRPr lang="he-IL" dirty="0"/>
+              <a:t>מתנצלות מראש על שפה פוגענית</a:t>
+            </a:r>
           </a:p>
         </p:txBody>
       </p:sp>
@@ -4985,7 +5153,7 @@
             <a:spLocks noGrp="1"/>
           </p:cNvSpPr>
           <p:nvPr>
-            <p:ph type="sldNum" sz="quarter" idx="10"/>
+            <p:ph type="sldNum" sz="quarter" idx="5"/>
           </p:nvPr>
         </p:nvSpPr>
         <p:spPr/>
@@ -4995,7 +5163,7 @@
           <a:p>
             <a:fld id="{476A9585-3896-4CC5-B07B-12C1E5AFAA07}" type="slidenum">
               <a:rPr lang="he-IL" smtClean="0"/>
-              <a:t>3</a:t>
+              <a:t>2</a:t>
             </a:fld>
             <a:endParaRPr lang="he-IL"/>
           </a:p>
@@ -5004,7 +5172,7 @@
     </p:spTree>
     <p:extLst>
       <p:ext uri="{BB962C8B-B14F-4D97-AF65-F5344CB8AC3E}">
-        <p14:creationId xmlns:p14="http://schemas.microsoft.com/office/powerpoint/2010/main" val="1285841092"/>
+        <p14:creationId xmlns:p14="http://schemas.microsoft.com/office/powerpoint/2010/main" val="3165700818"/>
       </p:ext>
     </p:extLst>
   </p:cSld>
@@ -5059,18 +5227,131 @@
           <a:lstStyle/>
           <a:p>
             <a:r>
+              <a:rPr lang="he-IL" sz="1200" b="0" i="0" kern="1200" dirty="0">
+                <a:solidFill>
+                  <a:schemeClr val="tx1"/>
+                </a:solidFill>
+                <a:effectLst/>
+                <a:latin typeface="+mn-lt"/>
+                <a:ea typeface="+mn-ea"/>
+                <a:cs typeface="+mn-cs"/>
+              </a:rPr>
+              <a:t>אז נתחיל </a:t>
+            </a:r>
+            <a:r>
+              <a:rPr lang="he-IL" sz="1200" b="0" i="0" kern="1200" dirty="0" err="1">
+                <a:solidFill>
+                  <a:schemeClr val="tx1"/>
+                </a:solidFill>
+                <a:effectLst/>
+                <a:latin typeface="+mn-lt"/>
+                <a:ea typeface="+mn-ea"/>
+                <a:cs typeface="+mn-cs"/>
+              </a:rPr>
+              <a:t>בקצת</a:t>
+            </a:r>
+            <a:r>
+              <a:rPr lang="he-IL" sz="1200" b="0" i="0" kern="1200" dirty="0">
+                <a:solidFill>
+                  <a:schemeClr val="tx1"/>
+                </a:solidFill>
+                <a:effectLst/>
+                <a:latin typeface="+mn-lt"/>
+                <a:ea typeface="+mn-ea"/>
+                <a:cs typeface="+mn-cs"/>
+              </a:rPr>
+              <a:t> רקע ומוטיבציה.. </a:t>
+            </a:r>
+          </a:p>
+          <a:p>
+            <a:r>
+              <a:rPr lang="he-IL" sz="1200" b="0" i="0" kern="1200" dirty="0">
+                <a:solidFill>
+                  <a:schemeClr val="tx1"/>
+                </a:solidFill>
+                <a:effectLst/>
+                <a:latin typeface="+mn-lt"/>
+                <a:ea typeface="+mn-ea"/>
+                <a:cs typeface="+mn-cs"/>
+              </a:rPr>
+              <a:t>האינטרנט יכול להיות מקום פורה ומעצים לילדים, אך בו בזמן גם בעל סכנות רבות אשר יכולות להשפיע על התפתחותם.</a:t>
+            </a:r>
+            <a:endParaRPr lang="en-US" sz="1200" b="0" i="0" kern="1200" dirty="0">
+              <a:solidFill>
+                <a:schemeClr val="tx1"/>
+              </a:solidFill>
+              <a:effectLst/>
+              <a:latin typeface="+mn-lt"/>
+              <a:ea typeface="+mn-ea"/>
+              <a:cs typeface="+mn-cs"/>
+            </a:endParaRPr>
+          </a:p>
+          <a:p>
+            <a:r>
+              <a:rPr lang="he-IL" sz="1200" b="0" i="0" kern="1200" dirty="0">
+                <a:solidFill>
+                  <a:schemeClr val="tx1"/>
+                </a:solidFill>
+                <a:effectLst/>
+                <a:latin typeface="+mn-lt"/>
+                <a:ea typeface="+mn-ea"/>
+                <a:cs typeface="+mn-cs"/>
+              </a:rPr>
+              <a:t>אז</a:t>
+            </a:r>
+            <a:r>
+              <a:rPr lang="he-IL" sz="1200" b="0" i="0" kern="1200" baseline="0" dirty="0">
+                <a:solidFill>
+                  <a:schemeClr val="tx1"/>
+                </a:solidFill>
+                <a:effectLst/>
+                <a:latin typeface="+mn-lt"/>
+                <a:ea typeface="+mn-ea"/>
+                <a:cs typeface="+mn-cs"/>
+              </a:rPr>
+              <a:t> מה זה בריונות ברשת? </a:t>
+            </a:r>
+            <a:r>
+              <a:rPr lang="he-IL" sz="1200" b="0" i="0" kern="1200" dirty="0">
+                <a:solidFill>
+                  <a:schemeClr val="tx1"/>
+                </a:solidFill>
+                <a:effectLst/>
+                <a:latin typeface="+mn-lt"/>
+                <a:ea typeface="+mn-ea"/>
+                <a:cs typeface="+mn-cs"/>
+              </a:rPr>
+              <a:t> בריונות ברשת היא תופעה חדשה יחסית בה נעשה שימוש באינטרנט על מנת להשמיץ, להטריד, להביך, להפחיד, או לתקוף אדם יחיד או קבוצה. היא</a:t>
+            </a:r>
+            <a:r>
+              <a:rPr lang="he-IL" sz="1200" b="0" i="0" kern="1200" baseline="0" dirty="0">
+                <a:solidFill>
+                  <a:schemeClr val="tx1"/>
+                </a:solidFill>
+                <a:effectLst/>
+                <a:latin typeface="+mn-lt"/>
+                <a:ea typeface="+mn-ea"/>
+                <a:cs typeface="+mn-cs"/>
+              </a:rPr>
+              <a:t> באה לידי ביטוי ב</a:t>
+            </a:r>
+            <a:r>
               <a:rPr lang="he-IL" dirty="0"/>
-              <a:t>נראה כמה נתונים מעניינים שחלקם אפילו הפתיעו אותנו</a:t>
+              <a:t>פרסום שמועות, איומים, הערות מיניות, מידע אישי של הקורבן</a:t>
+            </a:r>
+            <a:r>
+              <a:rPr lang="he-IL" baseline="0" dirty="0"/>
+              <a:t> ועוד. </a:t>
+            </a:r>
+          </a:p>
+          <a:p>
+            <a:r>
+              <a:rPr lang="he-IL" baseline="0" dirty="0"/>
+              <a:t>בריונות ברשת נפוצה מאוד בימנו, ובעיקר בקרב בני נוער. </a:t>
             </a:r>
           </a:p>
           <a:p>
             <a:endParaRPr lang="he-IL" dirty="0"/>
-          </a:p>
-          <a:p>
-            <a:r>
-              <a:rPr lang="he-IL" dirty="0"/>
-              <a:t>והינה כמה דוגמאות חיות</a:t>
-            </a:r>
           </a:p>
         </p:txBody>
       </p:sp>
@@ -5081,7 +5362,7 @@
             <a:spLocks noGrp="1"/>
           </p:cNvSpPr>
           <p:nvPr>
-            <p:ph type="sldNum" sz="quarter" idx="5"/>
+            <p:ph type="sldNum" sz="quarter" idx="10"/>
           </p:nvPr>
         </p:nvSpPr>
         <p:spPr/>
@@ -5091,7 +5372,7 @@
           <a:p>
             <a:fld id="{476A9585-3896-4CC5-B07B-12C1E5AFAA07}" type="slidenum">
               <a:rPr lang="he-IL" smtClean="0"/>
-              <a:t>4</a:t>
+              <a:t>3</a:t>
             </a:fld>
             <a:endParaRPr lang="he-IL"/>
           </a:p>
@@ -5100,7 +5381,7 @@
     </p:spTree>
     <p:extLst>
       <p:ext uri="{BB962C8B-B14F-4D97-AF65-F5344CB8AC3E}">
-        <p14:creationId xmlns:p14="http://schemas.microsoft.com/office/powerpoint/2010/main" val="367509698"/>
+        <p14:creationId xmlns:p14="http://schemas.microsoft.com/office/powerpoint/2010/main" val="1285841092"/>
       </p:ext>
     </p:extLst>
   </p:cSld>
@@ -5155,16 +5436,18 @@
           <a:lstStyle/>
           <a:p>
             <a:r>
-              <a:rPr lang="he-IL" dirty="0" err="1"/>
-              <a:t>הדומיין</a:t>
-            </a:r>
-            <a:r>
               <a:rPr lang="he-IL" dirty="0"/>
-              <a:t> הוא כאמור אלימות ברשת, ואת הבעיה הגדרנו כאיתור אלימות ברשתות חברתיות.</a:t>
+              <a:t>נראה כמה נתונים מעניינים שחלקם אפילו הפתיעו אותנו</a:t>
             </a:r>
           </a:p>
           <a:p>
             <a:endParaRPr lang="he-IL" dirty="0"/>
+          </a:p>
+          <a:p>
+            <a:r>
+              <a:rPr lang="he-IL" dirty="0"/>
+              <a:t>והינה כמה דוגמאות חיות</a:t>
+            </a:r>
           </a:p>
         </p:txBody>
       </p:sp>
@@ -5185,7 +5468,7 @@
           <a:p>
             <a:fld id="{476A9585-3896-4CC5-B07B-12C1E5AFAA07}" type="slidenum">
               <a:rPr lang="he-IL" smtClean="0"/>
-              <a:t>5</a:t>
+              <a:t>4</a:t>
             </a:fld>
             <a:endParaRPr lang="he-IL"/>
           </a:p>
@@ -5194,7 +5477,7 @@
     </p:spTree>
     <p:extLst>
       <p:ext uri="{BB962C8B-B14F-4D97-AF65-F5344CB8AC3E}">
-        <p14:creationId xmlns:p14="http://schemas.microsoft.com/office/powerpoint/2010/main" val="1683493042"/>
+        <p14:creationId xmlns:p14="http://schemas.microsoft.com/office/powerpoint/2010/main" val="367509698"/>
       </p:ext>
     </p:extLst>
   </p:cSld>
@@ -5249,20 +5532,12 @@
           <a:lstStyle/>
           <a:p>
             <a:r>
+              <a:rPr lang="he-IL" dirty="0" err="1"/>
+              <a:t>הדומיין</a:t>
+            </a:r>
+            <a:r>
               <a:rPr lang="he-IL" dirty="0"/>
-              <a:t>עכשיו נפרוט את שאלות המחקר:</a:t>
-            </a:r>
-          </a:p>
-          <a:p>
-            <a:r>
-              <a:rPr lang="he-IL" dirty="0"/>
-              <a:t>אז שאלת המחקר הראשונה היא האם ניתן לתייג הודעות ברשת לאלימות או לא?</a:t>
-            </a:r>
-          </a:p>
-          <a:p>
-            <a:r>
-              <a:rPr lang="he-IL" dirty="0"/>
-              <a:t>והשאלה השנייה היא מהן הסיבות העיקריות לאלימות ברשת?</a:t>
+              <a:t> הוא כאמור אלימות ברשת, ואת הבעיה הגדרנו כאיתור אלימות ברשתות חברתיות.</a:t>
             </a:r>
           </a:p>
           <a:p>
@@ -5287,7 +5562,7 @@
           <a:p>
             <a:fld id="{476A9585-3896-4CC5-B07B-12C1E5AFAA07}" type="slidenum">
               <a:rPr lang="he-IL" smtClean="0"/>
-              <a:t>6</a:t>
+              <a:t>5</a:t>
             </a:fld>
             <a:endParaRPr lang="he-IL"/>
           </a:p>
@@ -5296,7 +5571,7 @@
     </p:spTree>
     <p:extLst>
       <p:ext uri="{BB962C8B-B14F-4D97-AF65-F5344CB8AC3E}">
-        <p14:creationId xmlns:p14="http://schemas.microsoft.com/office/powerpoint/2010/main" val="3084089761"/>
+        <p14:creationId xmlns:p14="http://schemas.microsoft.com/office/powerpoint/2010/main" val="1683493042"/>
       </p:ext>
     </p:extLst>
   </p:cSld>
@@ -5350,90 +5625,21 @@
           <a:bodyPr/>
           <a:lstStyle/>
           <a:p>
-            <a:endParaRPr lang="he-IL" dirty="0"/>
-          </a:p>
-          <a:p>
             <a:r>
               <a:rPr lang="he-IL" dirty="0"/>
-              <a:t>אז </a:t>
-            </a:r>
-            <a:r>
-              <a:rPr lang="he-IL" dirty="0" err="1"/>
-              <a:t>הדאטא</a:t>
-            </a:r>
+              <a:t>עכשיו נפרוט את שאלות המחקר:</a:t>
+            </a:r>
+          </a:p>
+          <a:p>
             <a:r>
               <a:rPr lang="he-IL" dirty="0"/>
-              <a:t> שלנו מורכב מהודעות של בני נוער מהרשתות החברתיות, ההודעות </a:t>
-            </a:r>
-            <a:r>
-              <a:rPr lang="he-IL" dirty="0" err="1"/>
-              <a:t>מתויגויות</a:t>
-            </a:r>
+              <a:t>אז שאלת המחקר הראשונה היא האם ניתן לתייג הודעות ברשת לאלימות או לא?</a:t>
+            </a:r>
+          </a:p>
+          <a:p>
             <a:r>
               <a:rPr lang="he-IL" dirty="0"/>
-              <a:t> בסיווג בינארי לאלימות או לא אלימות.</a:t>
-            </a:r>
-          </a:p>
-          <a:p>
-            <a:r>
-              <a:rPr lang="he-IL" dirty="0"/>
-              <a:t>השגנו את המידע מחברת </a:t>
-            </a:r>
-            <a:r>
-              <a:rPr lang="he-IL" dirty="0" err="1"/>
-              <a:t>קיפרס</a:t>
-            </a:r>
-            <a:r>
-              <a:rPr lang="he-IL" dirty="0"/>
-              <a:t>. שמפתחים אפליקציית בקרת ההורים המציגה הודעות ספציפיות שזוהו כמסוכנות תוך שמירה על פרטיות הילדים. </a:t>
-            </a:r>
-          </a:p>
-          <a:p>
-            <a:r>
-              <a:rPr lang="he-IL" dirty="0" err="1"/>
-              <a:t>הדאטא</a:t>
-            </a:r>
-            <a:r>
-              <a:rPr lang="he-IL" dirty="0"/>
-              <a:t> מורכב </a:t>
-            </a:r>
-            <a:r>
-              <a:rPr lang="he-IL" dirty="0" err="1"/>
-              <a:t>מכ</a:t>
-            </a:r>
-            <a:r>
-              <a:rPr lang="he-IL" dirty="0"/>
-              <a:t> 5500 הודעות שמתויגות כלא אלימות וכ3800 אלימות. </a:t>
-            </a:r>
-          </a:p>
-          <a:p>
-            <a:r>
-              <a:rPr lang="he-IL" dirty="0"/>
-              <a:t>כאמור </a:t>
-            </a:r>
-            <a:r>
-              <a:rPr lang="he-IL" dirty="0" err="1"/>
-              <a:t>הדאטא</a:t>
-            </a:r>
-            <a:r>
-              <a:rPr lang="he-IL" dirty="0"/>
-              <a:t> שלנו הוא מורכב מהודעות של ילדים ובני נוער ומתאפיין בהמון סלנג, שגיאות כתיב, ריבו אותיות (כמו למשל טיפש שכתוב עם הרבה ש בסוף), מילים מחוברות (כמו </a:t>
-            </a:r>
-            <a:r>
-              <a:rPr lang="he-IL" dirty="0" err="1"/>
-              <a:t>חיימשלי</a:t>
-            </a:r>
-            <a:r>
-              <a:rPr lang="he-IL" dirty="0"/>
-              <a:t> או אמשך) בנוסף ההודעות מאוד קצרות בסגנון של הודעות </a:t>
-            </a:r>
-            <a:r>
-              <a:rPr lang="he-IL" dirty="0" err="1"/>
-              <a:t>וואצאפ</a:t>
-            </a:r>
-            <a:r>
-              <a:rPr lang="he-IL" dirty="0"/>
-              <a:t>.</a:t>
+              <a:t>והשאלה השנייה היא מהם סוגי האלימות ברשת?</a:t>
             </a:r>
           </a:p>
           <a:p>
@@ -5458,7 +5664,7 @@
           <a:p>
             <a:fld id="{476A9585-3896-4CC5-B07B-12C1E5AFAA07}" type="slidenum">
               <a:rPr lang="he-IL" smtClean="0"/>
-              <a:t>7</a:t>
+              <a:t>6</a:t>
             </a:fld>
             <a:endParaRPr lang="he-IL"/>
           </a:p>
@@ -5467,7 +5673,7 @@
     </p:spTree>
     <p:extLst>
       <p:ext uri="{BB962C8B-B14F-4D97-AF65-F5344CB8AC3E}">
-        <p14:creationId xmlns:p14="http://schemas.microsoft.com/office/powerpoint/2010/main" val="3093501333"/>
+        <p14:creationId xmlns:p14="http://schemas.microsoft.com/office/powerpoint/2010/main" val="3084089761"/>
       </p:ext>
     </p:extLst>
   </p:cSld>
@@ -5521,9 +5727,12 @@
           <a:bodyPr/>
           <a:lstStyle/>
           <a:p>
+            <a:endParaRPr lang="he-IL" dirty="0"/>
+          </a:p>
+          <a:p>
             <a:r>
               <a:rPr lang="he-IL" dirty="0"/>
-              <a:t>כאן אפשר לראות את חלוקת </a:t>
+              <a:t>אז </a:t>
             </a:r>
             <a:r>
               <a:rPr lang="he-IL" dirty="0" err="1"/>
@@ -5531,8 +5740,81 @@
             </a:r>
             <a:r>
               <a:rPr lang="he-IL" dirty="0"/>
-              <a:t> כפי שהצגתי קודם</a:t>
-            </a:r>
+              <a:t> שלנו מורכב מהודעות של בני נוער מהרשתות החברתיות, ההודעות </a:t>
+            </a:r>
+            <a:r>
+              <a:rPr lang="he-IL" dirty="0" err="1"/>
+              <a:t>מתויגויות</a:t>
+            </a:r>
+            <a:r>
+              <a:rPr lang="he-IL" dirty="0"/>
+              <a:t> בסיווג בינארי לאלימות או לא אלימות.</a:t>
+            </a:r>
+          </a:p>
+          <a:p>
+            <a:r>
+              <a:rPr lang="he-IL" dirty="0"/>
+              <a:t>השגנו את המידע מחברת </a:t>
+            </a:r>
+            <a:r>
+              <a:rPr lang="he-IL" dirty="0" err="1"/>
+              <a:t>קיפרס</a:t>
+            </a:r>
+            <a:r>
+              <a:rPr lang="he-IL" dirty="0"/>
+              <a:t>. שמפתחים אפליקציית בקרת ההורים המציגה הודעות ספציפיות שזוהו כמסוכנות תוך שמירה על פרטיות הילדים. </a:t>
+            </a:r>
+          </a:p>
+          <a:p>
+            <a:r>
+              <a:rPr lang="he-IL" dirty="0" err="1"/>
+              <a:t>הדאטא</a:t>
+            </a:r>
+            <a:r>
+              <a:rPr lang="he-IL" dirty="0"/>
+              <a:t> מורכב </a:t>
+            </a:r>
+            <a:r>
+              <a:rPr lang="he-IL" dirty="0" err="1"/>
+              <a:t>מכ</a:t>
+            </a:r>
+            <a:r>
+              <a:rPr lang="he-IL" dirty="0"/>
+              <a:t> 5500 הודעות שמתויגות כלא אלימות וכ3800 אלימות. </a:t>
+            </a:r>
+          </a:p>
+          <a:p>
+            <a:r>
+              <a:rPr lang="he-IL" dirty="0"/>
+              <a:t>כאמור </a:t>
+            </a:r>
+            <a:r>
+              <a:rPr lang="he-IL" dirty="0" err="1"/>
+              <a:t>הדאטא</a:t>
+            </a:r>
+            <a:r>
+              <a:rPr lang="he-IL" dirty="0"/>
+              <a:t> שלנו הוא מורכב מהודעות של ילדים ובני נוער ומתאפיין בהמון סלנג, שגיאות כתיב, ריבו אותיות (כמו למשל טיפש שכתוב עם הרבה ש בסוף), מילים מחוברות (כמו </a:t>
+            </a:r>
+            <a:r>
+              <a:rPr lang="he-IL" dirty="0" err="1"/>
+              <a:t>חיימשלי</a:t>
+            </a:r>
+            <a:r>
+              <a:rPr lang="he-IL" dirty="0"/>
+              <a:t> או אמשך) בנוסף ההודעות מאוד קצרות בסגנון של הודעות </a:t>
+            </a:r>
+            <a:r>
+              <a:rPr lang="he-IL" dirty="0" err="1"/>
+              <a:t>וואצאפ</a:t>
+            </a:r>
+            <a:r>
+              <a:rPr lang="he-IL" dirty="0"/>
+              <a:t>.</a:t>
+            </a:r>
+          </a:p>
+          <a:p>
+            <a:endParaRPr lang="he-IL" dirty="0"/>
           </a:p>
         </p:txBody>
       </p:sp>
@@ -5553,7 +5835,7 @@
           <a:p>
             <a:fld id="{476A9585-3896-4CC5-B07B-12C1E5AFAA07}" type="slidenum">
               <a:rPr lang="he-IL" smtClean="0"/>
-              <a:t>8</a:t>
+              <a:t>7</a:t>
             </a:fld>
             <a:endParaRPr lang="he-IL"/>
           </a:p>
@@ -5562,7 +5844,7 @@
     </p:spTree>
     <p:extLst>
       <p:ext uri="{BB962C8B-B14F-4D97-AF65-F5344CB8AC3E}">
-        <p14:creationId xmlns:p14="http://schemas.microsoft.com/office/powerpoint/2010/main" val="1946554989"/>
+        <p14:creationId xmlns:p14="http://schemas.microsoft.com/office/powerpoint/2010/main" val="3093501333"/>
       </p:ext>
     </p:extLst>
   </p:cSld>
@@ -5618,226 +5900,15 @@
           <a:p>
             <a:r>
               <a:rPr lang="he-IL" dirty="0"/>
-              <a:t>עכשיו נתאר את </a:t>
+              <a:t>כאן אפשר לראות את חלוקת </a:t>
             </a:r>
             <a:r>
               <a:rPr lang="he-IL" dirty="0" err="1"/>
-              <a:t>הפייפליין</a:t>
+              <a:t>הדאטא</a:t>
             </a:r>
             <a:r>
               <a:rPr lang="he-IL" dirty="0"/>
-              <a:t> שבחרנו לבצע – </a:t>
-            </a:r>
-          </a:p>
-          <a:p>
-            <a:r>
-              <a:rPr lang="he-IL" dirty="0"/>
-              <a:t>מה שמסומן בצהוב אלו דברים שכבר עשינו ובאדום עוד לא או חלקית.</a:t>
-            </a:r>
-          </a:p>
-          <a:p>
-            <a:r>
-              <a:rPr lang="he-IL" dirty="0"/>
-              <a:t>תחילה בצענו </a:t>
-            </a:r>
-            <a:r>
-              <a:rPr lang="en-US" dirty="0"/>
-              <a:t>Text normalization</a:t>
-            </a:r>
-            <a:r>
-              <a:rPr lang="he-IL" dirty="0"/>
-              <a:t> בהתאם למאפיינים הייחודים של </a:t>
-            </a:r>
-            <a:r>
-              <a:rPr lang="he-IL" dirty="0" err="1"/>
-              <a:t>הדאטה</a:t>
-            </a:r>
-            <a:r>
-              <a:rPr lang="he-IL" dirty="0"/>
-              <a:t> שלנו כפי שמאי תארה. שלב זה כלל – הורדת סטופ וורד בהתאם לקורפוס שלנו, </a:t>
-            </a:r>
-            <a:r>
-              <a:rPr lang="he-IL" dirty="0" err="1"/>
-              <a:t>למטיזציה</a:t>
-            </a:r>
-            <a:r>
-              <a:rPr lang="he-IL" dirty="0"/>
-              <a:t> בעזרת </a:t>
-            </a:r>
-            <a:r>
-              <a:rPr lang="en-US" dirty="0"/>
-              <a:t>YAP</a:t>
-            </a:r>
-            <a:r>
-              <a:rPr lang="he-IL" dirty="0"/>
-              <a:t>, בניית מילון סלנג שנעשה על ידנו, ומגוון </a:t>
-            </a:r>
-            <a:r>
-              <a:rPr lang="he-IL" dirty="0" err="1"/>
-              <a:t>רגקסים</a:t>
-            </a:r>
-            <a:r>
-              <a:rPr lang="he-IL" dirty="0"/>
-              <a:t> לתיקון </a:t>
-            </a:r>
-            <a:r>
-              <a:rPr lang="he-IL" dirty="0" err="1"/>
-              <a:t>הדאטה</a:t>
-            </a:r>
-            <a:r>
-              <a:rPr lang="he-IL" dirty="0"/>
-              <a:t>.</a:t>
-            </a:r>
-          </a:p>
-          <a:p>
-            <a:r>
-              <a:rPr lang="he-IL" dirty="0"/>
-              <a:t>השלב הבא בתהליך שאנו מצפות שישפר לנו את התוצאות הוא </a:t>
-            </a:r>
-            <a:r>
-              <a:rPr lang="en-US" dirty="0"/>
-              <a:t>feature selection</a:t>
-            </a:r>
-            <a:r>
-              <a:rPr lang="he-IL" dirty="0"/>
-              <a:t> ואותו טרם בצענו.</a:t>
-            </a:r>
-          </a:p>
-          <a:p>
-            <a:r>
-              <a:rPr lang="he-IL" dirty="0"/>
-              <a:t>לאחר מכן ניסינו לבצע את משימת הסיווג בעזרת מסווגים שונים כמו </a:t>
-            </a:r>
-            <a:r>
-              <a:rPr lang="he-IL" dirty="0" err="1"/>
-              <a:t>נאיב</a:t>
-            </a:r>
-            <a:r>
-              <a:rPr lang="he-IL" dirty="0"/>
-              <a:t> </a:t>
-            </a:r>
-            <a:r>
-              <a:rPr lang="he-IL" dirty="0" err="1"/>
-              <a:t>בייס</a:t>
-            </a:r>
-            <a:r>
-              <a:rPr lang="he-IL" dirty="0"/>
-              <a:t>, רגרסיה לוגיסטית </a:t>
-            </a:r>
-            <a:r>
-              <a:rPr lang="he-IL" dirty="0" err="1"/>
-              <a:t>ורנשום</a:t>
-            </a:r>
-            <a:r>
-              <a:rPr lang="he-IL" dirty="0"/>
-              <a:t> </a:t>
-            </a:r>
-            <a:r>
-              <a:rPr lang="he-IL" dirty="0" err="1"/>
-              <a:t>פורסט</a:t>
-            </a:r>
-            <a:r>
-              <a:rPr lang="he-IL" dirty="0"/>
-              <a:t> תוך השוואה למסווג </a:t>
-            </a:r>
-            <a:r>
-              <a:rPr lang="he-IL" dirty="0" err="1"/>
-              <a:t>בייסליין</a:t>
-            </a:r>
-            <a:r>
-              <a:rPr lang="he-IL" dirty="0"/>
-              <a:t> (בחרנו שהוא יהיה מסווג על פי הרב). כחלק מההכנה לתהליך </a:t>
-            </a:r>
-            <a:r>
-              <a:rPr lang="he-IL" dirty="0" err="1"/>
-              <a:t>היווג</a:t>
-            </a:r>
-            <a:r>
-              <a:rPr lang="he-IL" dirty="0"/>
-              <a:t> בצענו </a:t>
-            </a:r>
-            <a:r>
-              <a:rPr lang="en-US" dirty="0"/>
-              <a:t>word embedding </a:t>
-            </a:r>
-            <a:r>
-              <a:rPr lang="he-IL" dirty="0"/>
-              <a:t> בעזרת </a:t>
-            </a:r>
-            <a:r>
-              <a:rPr lang="en-US" dirty="0"/>
-              <a:t>bag of words</a:t>
-            </a:r>
-            <a:r>
-              <a:rPr lang="he-IL" dirty="0"/>
-              <a:t> תוך שימוש ב</a:t>
-            </a:r>
-            <a:r>
-              <a:rPr lang="en-US" dirty="0" err="1"/>
-              <a:t>tf-idf</a:t>
-            </a:r>
-            <a:r>
-              <a:rPr lang="en-US" dirty="0"/>
-              <a:t> </a:t>
-            </a:r>
-            <a:r>
-              <a:rPr lang="he-IL" dirty="0"/>
-              <a:t> בכדי לקבל הבנה יותר טובה של ההקשר של המילים כחלק מהודעה אחת עם קונטקסט מסוים.</a:t>
-            </a:r>
-          </a:p>
-          <a:p>
-            <a:r>
-              <a:rPr lang="he-IL" dirty="0"/>
-              <a:t>בכדי לנסות לענות על שאלת המחקר השנייה שלנו (מהן הסבות לאלימות ברשת)- ניסינו לעשות </a:t>
-            </a:r>
-            <a:r>
-              <a:rPr lang="he-IL" dirty="0" err="1"/>
-              <a:t>קלאסטרינג</a:t>
-            </a:r>
-            <a:r>
-              <a:rPr lang="he-IL" dirty="0"/>
-              <a:t> בעזרת אלגוריתם </a:t>
-            </a:r>
-            <a:r>
-              <a:rPr lang="en-US" dirty="0"/>
-              <a:t>k-means</a:t>
-            </a:r>
-            <a:r>
-              <a:rPr lang="he-IL" dirty="0"/>
-              <a:t>.</a:t>
-            </a:r>
-          </a:p>
-          <a:p>
-            <a:endParaRPr lang="he-IL" dirty="0"/>
-          </a:p>
-          <a:p>
-            <a:r>
-              <a:rPr lang="he-IL" dirty="0"/>
-              <a:t>בהמשך נרצה לנסות לשפר את </a:t>
-            </a:r>
-            <a:r>
-              <a:rPr lang="he-IL" dirty="0" err="1"/>
-              <a:t>הקלאסטרינג</a:t>
-            </a:r>
-            <a:r>
-              <a:rPr lang="he-IL" dirty="0"/>
-              <a:t>, לסווג בעזרת </a:t>
-            </a:r>
-            <a:r>
-              <a:rPr lang="en-US" dirty="0"/>
-              <a:t>BERT</a:t>
-            </a:r>
-            <a:r>
-              <a:rPr lang="he-IL" dirty="0"/>
-              <a:t> ולהוסיף את שלב ה- </a:t>
-            </a:r>
-            <a:r>
-              <a:rPr lang="en-US" dirty="0"/>
-              <a:t>feature selection</a:t>
-            </a:r>
-            <a:r>
-              <a:rPr lang="he-IL" dirty="0"/>
-              <a:t>.</a:t>
+              <a:t> כפי שהצגתי קודם</a:t>
             </a:r>
           </a:p>
         </p:txBody>
@@ -5859,7 +5930,7 @@
           <a:p>
             <a:fld id="{476A9585-3896-4CC5-B07B-12C1E5AFAA07}" type="slidenum">
               <a:rPr lang="he-IL" smtClean="0"/>
-              <a:t>9</a:t>
+              <a:t>8</a:t>
             </a:fld>
             <a:endParaRPr lang="he-IL"/>
           </a:p>
@@ -5868,7 +5939,7 @@
     </p:spTree>
     <p:extLst>
       <p:ext uri="{BB962C8B-B14F-4D97-AF65-F5344CB8AC3E}">
-        <p14:creationId xmlns:p14="http://schemas.microsoft.com/office/powerpoint/2010/main" val="2641001258"/>
+        <p14:creationId xmlns:p14="http://schemas.microsoft.com/office/powerpoint/2010/main" val="1946554989"/>
       </p:ext>
     </p:extLst>
   </p:cSld>
@@ -5924,211 +5995,227 @@
           <a:p>
             <a:r>
               <a:rPr lang="he-IL" dirty="0"/>
-              <a:t>כאן ניתן לראות את תוצאות המסווגים השונים אותם ניסינו עד כה על פי מספר מדדים.</a:t>
-            </a:r>
-          </a:p>
-          <a:p>
+              <a:t>עכשיו נתאר את </a:t>
+            </a:r>
+            <a:r>
+              <a:rPr lang="he-IL" dirty="0" err="1"/>
+              <a:t>הפייפליין</a:t>
+            </a:r>
             <a:r>
               <a:rPr lang="he-IL" dirty="0"/>
-              <a:t>כאשר החלטנו כי </a:t>
-            </a:r>
-            <a:r>
-              <a:rPr lang="he-IL" sz="1200" b="0" i="0" u="none" strike="noStrike" kern="1200" dirty="0">
-                <a:solidFill>
-                  <a:schemeClr val="tx1"/>
-                </a:solidFill>
-                <a:effectLst/>
-                <a:latin typeface="+mn-lt"/>
-                <a:ea typeface="+mn-ea"/>
-                <a:cs typeface="+mn-cs"/>
-              </a:rPr>
-              <a:t>עבורנו ה </a:t>
-            </a:r>
-            <a:r>
-              <a:rPr lang="en-US" sz="1200" b="0" i="0" u="none" strike="noStrike" kern="1200" dirty="0">
-                <a:solidFill>
-                  <a:schemeClr val="tx1"/>
-                </a:solidFill>
-                <a:effectLst/>
-                <a:latin typeface="+mn-lt"/>
-                <a:ea typeface="+mn-ea"/>
-                <a:cs typeface="+mn-cs"/>
-              </a:rPr>
-              <a:t> recall </a:t>
-            </a:r>
-            <a:r>
-              <a:rPr lang="he-IL" sz="1200" b="0" i="0" u="none" strike="noStrike" kern="1200" dirty="0">
-                <a:solidFill>
-                  <a:schemeClr val="tx1"/>
-                </a:solidFill>
-                <a:effectLst/>
-                <a:latin typeface="+mn-lt"/>
-                <a:ea typeface="+mn-ea"/>
-                <a:cs typeface="+mn-cs"/>
-              </a:rPr>
-              <a:t>יותר משמעותי, כיוון שטעות פחות חמורה עבורנו היא לסווג הודעה לא אלימה כאלימה.</a:t>
-            </a:r>
-          </a:p>
-          <a:p>
-            <a:r>
-              <a:rPr lang="he-IL" sz="1200" b="0" i="0" u="none" strike="noStrike" kern="1200" dirty="0">
-                <a:solidFill>
-                  <a:schemeClr val="tx1"/>
-                </a:solidFill>
-                <a:effectLst/>
-                <a:latin typeface="+mn-lt"/>
-                <a:ea typeface="+mn-ea"/>
-                <a:cs typeface="+mn-cs"/>
-              </a:rPr>
-              <a:t>לכן החלטנו לשים דגש על מדד ה</a:t>
-            </a:r>
-            <a:r>
-              <a:rPr lang="en-US" sz="1200" b="0" i="0" u="none" strike="noStrike" kern="1200" dirty="0">
-                <a:solidFill>
-                  <a:schemeClr val="tx1"/>
-                </a:solidFill>
-                <a:effectLst/>
-                <a:latin typeface="+mn-lt"/>
-                <a:ea typeface="+mn-ea"/>
-                <a:cs typeface="+mn-cs"/>
-              </a:rPr>
-              <a:t>F2</a:t>
-            </a:r>
-            <a:r>
-              <a:rPr lang="he-IL" sz="1200" b="0" i="0" u="none" strike="noStrike" kern="1200" dirty="0">
-                <a:solidFill>
-                  <a:schemeClr val="tx1"/>
-                </a:solidFill>
-                <a:effectLst/>
-                <a:latin typeface="+mn-lt"/>
-                <a:ea typeface="+mn-ea"/>
-                <a:cs typeface="+mn-cs"/>
-              </a:rPr>
-              <a:t> שבעצם נותן יותר משקל ל</a:t>
-            </a:r>
-            <a:r>
-              <a:rPr lang="en-US" sz="1200" b="0" i="0" u="none" strike="noStrike" kern="1200" dirty="0">
-                <a:solidFill>
-                  <a:schemeClr val="tx1"/>
-                </a:solidFill>
-                <a:effectLst/>
-                <a:latin typeface="+mn-lt"/>
-                <a:ea typeface="+mn-ea"/>
-                <a:cs typeface="+mn-cs"/>
-              </a:rPr>
-              <a:t>recall</a:t>
-            </a:r>
-            <a:r>
-              <a:rPr lang="he-IL" sz="1200" b="0" i="0" u="none" strike="noStrike" kern="1200" dirty="0">
-                <a:solidFill>
-                  <a:schemeClr val="tx1"/>
-                </a:solidFill>
-                <a:effectLst/>
-                <a:latin typeface="+mn-lt"/>
-                <a:ea typeface="+mn-ea"/>
-                <a:cs typeface="+mn-cs"/>
-              </a:rPr>
-              <a:t> מאשר ל</a:t>
-            </a:r>
-            <a:r>
-              <a:rPr lang="en-US" sz="1200" b="0" i="0" u="none" strike="noStrike" kern="1200" dirty="0" err="1">
-                <a:solidFill>
-                  <a:schemeClr val="tx1"/>
-                </a:solidFill>
-                <a:effectLst/>
-                <a:latin typeface="+mn-lt"/>
-                <a:ea typeface="+mn-ea"/>
-                <a:cs typeface="+mn-cs"/>
-              </a:rPr>
-              <a:t>presicion</a:t>
-            </a:r>
-            <a:r>
-              <a:rPr lang="en-US" sz="1200" b="0" i="0" u="none" strike="noStrike" kern="1200" dirty="0">
-                <a:solidFill>
-                  <a:schemeClr val="tx1"/>
-                </a:solidFill>
-                <a:effectLst/>
-                <a:latin typeface="+mn-lt"/>
-                <a:ea typeface="+mn-ea"/>
-                <a:cs typeface="+mn-cs"/>
-              </a:rPr>
+              <a:t> שבחרנו לבצע – </a:t>
+            </a:r>
+          </a:p>
+          <a:p>
+            <a:r>
+              <a:rPr lang="he-IL" dirty="0"/>
+              <a:t>מה שמסומן בצהוב אלו דברים שכבר עשינו ובאדום עוד לא או חלקית.</a:t>
+            </a:r>
+          </a:p>
+          <a:p>
+            <a:r>
+              <a:rPr lang="he-IL" dirty="0"/>
+              <a:t>תחילה בצענו </a:t>
+            </a:r>
+            <a:r>
+              <a:rPr lang="en-US" dirty="0"/>
+              <a:t>Text normalization</a:t>
+            </a:r>
+            <a:r>
+              <a:rPr lang="he-IL" dirty="0"/>
+              <a:t> בהתאם למאפיינים הייחודים של </a:t>
+            </a:r>
+            <a:r>
+              <a:rPr lang="he-IL" dirty="0" err="1"/>
+              <a:t>הדאטה</a:t>
+            </a:r>
+            <a:r>
+              <a:rPr lang="he-IL" dirty="0"/>
+              <a:t> שלנו כפי שמאי תארה. שלב זה כלל – הורדת סטופ וורד בהתאם לקורפוס שלנו, </a:t>
+            </a:r>
+            <a:r>
+              <a:rPr lang="he-IL" dirty="0" err="1"/>
+              <a:t>למטיזציה</a:t>
+            </a:r>
+            <a:r>
+              <a:rPr lang="he-IL" dirty="0"/>
+              <a:t> בעזרת </a:t>
+            </a:r>
+            <a:r>
+              <a:rPr lang="en-US" dirty="0"/>
+              <a:t>YAP</a:t>
+            </a:r>
+            <a:r>
+              <a:rPr lang="he-IL" dirty="0"/>
+              <a:t>, בניית מילון סלנג שנעשה על ידנו, ומגוון </a:t>
+            </a:r>
+            <a:r>
+              <a:rPr lang="he-IL" dirty="0" err="1"/>
+              <a:t>רגקסים</a:t>
+            </a:r>
+            <a:r>
+              <a:rPr lang="he-IL" dirty="0"/>
+              <a:t> לתיקון </a:t>
+            </a:r>
+            <a:r>
+              <a:rPr lang="he-IL" dirty="0" err="1"/>
+              <a:t>הדאטה</a:t>
+            </a:r>
+            <a:r>
+              <a:rPr lang="he-IL" dirty="0"/>
+              <a:t>.</a:t>
+            </a:r>
+          </a:p>
+          <a:p>
+            <a:r>
+              <a:rPr lang="he-IL" dirty="0"/>
+              <a:t>השלב הבא בתהליך שאנו מצפות שישפר לנו את התוצאות הוא </a:t>
+            </a:r>
+            <a:r>
+              <a:rPr lang="en-US" dirty="0"/>
+              <a:t>feature selection</a:t>
+            </a:r>
+            <a:r>
+              <a:rPr lang="he-IL" dirty="0"/>
+              <a:t> ואותו טרם בצענו.</a:t>
+            </a:r>
+          </a:p>
+          <a:p>
+            <a:r>
+              <a:rPr lang="he-IL" dirty="0"/>
+              <a:t>לאחר מכן ניסינו לבצע את משימת הסיווג בעזרת מסווגים שונים כמו </a:t>
+            </a:r>
+            <a:r>
+              <a:rPr lang="he-IL" dirty="0" err="1"/>
+              <a:t>נאיב</a:t>
+            </a:r>
+            <a:r>
+              <a:rPr lang="he-IL" dirty="0"/>
               <a:t> </a:t>
             </a:r>
             <a:r>
-              <a:rPr lang="he-IL" sz="1200" b="0" i="0" u="none" strike="noStrike" kern="1200" dirty="0">
-                <a:solidFill>
-                  <a:schemeClr val="tx1"/>
-                </a:solidFill>
-                <a:effectLst/>
-                <a:latin typeface="+mn-lt"/>
-                <a:ea typeface="+mn-ea"/>
-                <a:cs typeface="+mn-cs"/>
-              </a:rPr>
-              <a:t> כפי שרצינו.</a:t>
-            </a:r>
-          </a:p>
-          <a:p>
-            <a:r>
-              <a:rPr lang="he-IL" sz="1200" b="0" i="0" u="none" strike="noStrike" kern="1200" dirty="0">
-                <a:solidFill>
-                  <a:schemeClr val="tx1"/>
-                </a:solidFill>
-                <a:effectLst/>
-                <a:latin typeface="+mn-lt"/>
-                <a:ea typeface="+mn-ea"/>
-                <a:cs typeface="+mn-cs"/>
-              </a:rPr>
-              <a:t>מהתוצאות האלו ניתן לראות כי עד כה </a:t>
-            </a:r>
-            <a:r>
-              <a:rPr lang="he-IL" sz="1200" b="0" i="0" u="none" strike="noStrike" kern="1200" dirty="0" err="1">
-                <a:solidFill>
-                  <a:schemeClr val="tx1"/>
-                </a:solidFill>
-                <a:effectLst/>
-                <a:latin typeface="+mn-lt"/>
-                <a:ea typeface="+mn-ea"/>
-                <a:cs typeface="+mn-cs"/>
-              </a:rPr>
-              <a:t>הרנדום</a:t>
-            </a:r>
-            <a:r>
-              <a:rPr lang="he-IL" sz="1200" b="0" i="0" u="none" strike="noStrike" kern="1200" dirty="0">
-                <a:solidFill>
-                  <a:schemeClr val="tx1"/>
-                </a:solidFill>
-                <a:effectLst/>
-                <a:latin typeface="+mn-lt"/>
-                <a:ea typeface="+mn-ea"/>
-                <a:cs typeface="+mn-cs"/>
-              </a:rPr>
+              <a:rPr lang="he-IL" dirty="0" err="1"/>
+              <a:t>בייס</a:t>
+            </a:r>
+            <a:r>
+              <a:rPr lang="he-IL" dirty="0"/>
+              <a:t>, רגרסיה לוגיסטית </a:t>
+            </a:r>
+            <a:r>
+              <a:rPr lang="he-IL" dirty="0" err="1"/>
+              <a:t>ורנשום</a:t>
+            </a:r>
+            <a:r>
+              <a:rPr lang="he-IL" dirty="0"/>
               <a:t> </a:t>
             </a:r>
             <a:r>
-              <a:rPr lang="he-IL" sz="1200" b="0" i="0" u="none" strike="noStrike" kern="1200" dirty="0" err="1">
-                <a:solidFill>
-                  <a:schemeClr val="tx1"/>
-                </a:solidFill>
-                <a:effectLst/>
-                <a:latin typeface="+mn-lt"/>
-                <a:ea typeface="+mn-ea"/>
-                <a:cs typeface="+mn-cs"/>
-              </a:rPr>
+              <a:rPr lang="he-IL" dirty="0" err="1"/>
               <a:t>פורסט</a:t>
             </a:r>
             <a:r>
-              <a:rPr lang="he-IL" sz="1200" b="0" i="0" u="none" strike="noStrike" kern="1200" dirty="0">
-                <a:solidFill>
-                  <a:schemeClr val="tx1"/>
-                </a:solidFill>
-                <a:effectLst/>
-                <a:latin typeface="+mn-lt"/>
-                <a:ea typeface="+mn-ea"/>
-                <a:cs typeface="+mn-cs"/>
-              </a:rPr>
-              <a:t> סיווג את ההודעות בצורה הטובה ביותר.</a:t>
-            </a:r>
+              <a:rPr lang="he-IL" dirty="0"/>
+              <a:t> תוך השוואה למסווג </a:t>
+            </a:r>
+            <a:r>
+              <a:rPr lang="he-IL" dirty="0" err="1"/>
+              <a:t>בייסליין</a:t>
+            </a:r>
+            <a:r>
+              <a:rPr lang="he-IL" dirty="0"/>
+              <a:t> (בחרנו שהוא יהיה מסווג על פי הרב). כחלק מההכנה לתהליך </a:t>
+            </a:r>
+            <a:r>
+              <a:rPr lang="he-IL" dirty="0" err="1"/>
+              <a:t>היווג</a:t>
+            </a:r>
+            <a:r>
+              <a:rPr lang="he-IL" dirty="0"/>
+              <a:t> בצענו </a:t>
+            </a:r>
+            <a:r>
+              <a:rPr lang="en-US" dirty="0"/>
+              <a:t>word embedding </a:t>
+            </a:r>
+            <a:r>
+              <a:rPr lang="he-IL" dirty="0"/>
+              <a:t> בעזרת </a:t>
+            </a:r>
+            <a:r>
+              <a:rPr lang="en-US" dirty="0"/>
+              <a:t>bag of words</a:t>
+            </a:r>
+            <a:r>
+              <a:rPr lang="he-IL" dirty="0"/>
+              <a:t> תוך שימוש ב</a:t>
+            </a:r>
+            <a:r>
+              <a:rPr lang="en-US" dirty="0" err="1"/>
+              <a:t>tf-idf</a:t>
+            </a:r>
+            <a:r>
+              <a:rPr lang="en-US" dirty="0"/>
+              <a:t> </a:t>
+            </a:r>
+            <a:r>
+              <a:rPr lang="he-IL" dirty="0"/>
+              <a:t> בכדי לקבל הבנה יותר טובה של ההקשר של המילים כחלק מהודעה אחת עם קונטקסט מסוים.</a:t>
+            </a:r>
+          </a:p>
+          <a:p>
+            <a:r>
+              <a:rPr lang="he-IL" dirty="0"/>
+              <a:t>בכדי לנסות לענות על שאלת המחקר השנייה שלנו (מהם סוגי האלימות ברשת)- ניסינו לעשות </a:t>
+            </a:r>
+            <a:r>
+              <a:rPr lang="he-IL" dirty="0" err="1"/>
+              <a:t>קלאסטרינג</a:t>
+            </a:r>
+            <a:r>
+              <a:rPr lang="he-IL" dirty="0"/>
+              <a:t> בעזרת אלגוריתם </a:t>
+            </a:r>
+            <a:r>
+              <a:rPr lang="en-US" dirty="0"/>
+              <a:t>k-means</a:t>
+            </a:r>
+            <a:r>
+              <a:rPr lang="he-IL" dirty="0"/>
+              <a:t>.</a:t>
+            </a:r>
+          </a:p>
+          <a:p>
             <a:endParaRPr lang="he-IL" dirty="0"/>
+          </a:p>
+          <a:p>
+            <a:r>
+              <a:rPr lang="he-IL" dirty="0"/>
+              <a:t>בהמשך נרצה לנסות לשפר את </a:t>
+            </a:r>
+            <a:r>
+              <a:rPr lang="he-IL" dirty="0" err="1"/>
+              <a:t>הקלאסטרינג</a:t>
+            </a:r>
+            <a:r>
+              <a:rPr lang="he-IL" dirty="0"/>
+              <a:t>, לסווג בעזרת </a:t>
+            </a:r>
+            <a:r>
+              <a:rPr lang="en-US" dirty="0"/>
+              <a:t>BERT</a:t>
+            </a:r>
+            <a:r>
+              <a:rPr lang="he-IL" dirty="0"/>
+              <a:t> ולהוסיף את שלב ה- </a:t>
+            </a:r>
+            <a:r>
+              <a:rPr lang="en-US" dirty="0"/>
+              <a:t>feature selection</a:t>
+            </a:r>
+            <a:r>
+              <a:rPr lang="he-IL" dirty="0"/>
+              <a:t>.</a:t>
+            </a:r>
           </a:p>
         </p:txBody>
       </p:sp>
@@ -6149,7 +6236,7 @@
           <a:p>
             <a:fld id="{476A9585-3896-4CC5-B07B-12C1E5AFAA07}" type="slidenum">
               <a:rPr lang="he-IL" smtClean="0"/>
-              <a:t>10</a:t>
+              <a:t>9</a:t>
             </a:fld>
             <a:endParaRPr lang="he-IL"/>
           </a:p>
@@ -6158,7 +6245,7 @@
     </p:spTree>
     <p:extLst>
       <p:ext uri="{BB962C8B-B14F-4D97-AF65-F5344CB8AC3E}">
-        <p14:creationId xmlns:p14="http://schemas.microsoft.com/office/powerpoint/2010/main" val="649913656"/>
+        <p14:creationId xmlns:p14="http://schemas.microsoft.com/office/powerpoint/2010/main" val="2641001258"/>
       </p:ext>
     </p:extLst>
   </p:cSld>
@@ -13846,7 +13933,7 @@
                 <a:latin typeface="Arial" panose="020B0604020202020204" pitchFamily="34" charset="0"/>
                 <a:cs typeface="Arial" panose="020B0604020202020204" pitchFamily="34" charset="0"/>
               </a:rPr>
-              <a:t>We partially found an answer to the reason for cyberbullying.</a:t>
+              <a:t>We partially found an answer to the types of cyberbullying.</a:t>
             </a:r>
           </a:p>
           <a:p>
@@ -14161,84 +14248,70 @@
           <a:chExt cx="0" cy="0"/>
         </a:xfrm>
       </p:grpSpPr>
-      <p:sp>
-        <p:nvSpPr>
-          <p:cNvPr id="2" name="כותרת 1">
+      <p:pic>
+        <p:nvPicPr>
+          <p:cNvPr id="1026" name="Picture 2" descr="18 Symbol Images, Stock Photos &amp; Vectors | Shutterstock">
             <a:extLst>
               <a:ext uri="{FF2B5EF4-FFF2-40B4-BE49-F238E27FC236}">
-                <a16:creationId xmlns:a16="http://schemas.microsoft.com/office/drawing/2014/main" id="{D5F8F565-99F0-4135-BEFE-F7B0D0641AAB}"/>
-              </a:ext>
-            </a:extLst>
-          </p:cNvPr>
-          <p:cNvSpPr>
-            <a:spLocks noGrp="1"/>
-          </p:cNvSpPr>
-          <p:nvPr>
-            <p:ph type="title"/>
-          </p:nvPr>
-        </p:nvSpPr>
-        <p:spPr/>
-        <p:txBody>
-          <a:bodyPr/>
-          <a:lstStyle/>
-          <a:p>
-            <a:endParaRPr lang="he-IL"/>
-          </a:p>
-        </p:txBody>
-      </p:sp>
-      <p:sp>
-        <p:nvSpPr>
-          <p:cNvPr id="3" name="מציין מיקום תוכן 2">
-            <a:extLst>
-              <a:ext uri="{FF2B5EF4-FFF2-40B4-BE49-F238E27FC236}">
-                <a16:creationId xmlns:a16="http://schemas.microsoft.com/office/drawing/2014/main" id="{38FCA785-880C-4FB1-8DB7-99F573864D64}"/>
-              </a:ext>
-            </a:extLst>
-          </p:cNvPr>
-          <p:cNvSpPr>
-            <a:spLocks noGrp="1"/>
-          </p:cNvSpPr>
-          <p:nvPr>
-            <p:ph idx="1"/>
-          </p:nvPr>
-        </p:nvSpPr>
-        <p:spPr/>
-        <p:txBody>
-          <a:bodyPr/>
-          <a:lstStyle/>
-          <a:p>
-            <a:endParaRPr lang="he-IL"/>
-          </a:p>
-        </p:txBody>
-      </p:sp>
-      <p:pic>
-        <p:nvPicPr>
-          <p:cNvPr id="4" name="תמונה 3">
-            <a:extLst>
-              <a:ext uri="{FF2B5EF4-FFF2-40B4-BE49-F238E27FC236}">
-                <a16:creationId xmlns:a16="http://schemas.microsoft.com/office/drawing/2014/main" id="{9028CF99-DEB9-40A5-9978-B1BB04ED6BA7}"/>
+                <a16:creationId xmlns:a16="http://schemas.microsoft.com/office/drawing/2014/main" id="{711A2FA9-A2B6-4ECA-878E-A79890FA43B5}"/>
               </a:ext>
             </a:extLst>
           </p:cNvPr>
           <p:cNvPicPr>
-            <a:picLocks noChangeAspect="1"/>
+            <a:picLocks noChangeAspect="1" noChangeArrowheads="1"/>
           </p:cNvPicPr>
           <p:nvPr/>
         </p:nvPicPr>
         <p:blipFill>
-          <a:blip r:embed="rId2"/>
+          <a:blip r:embed="rId3">
+            <a:extLst>
+              <a:ext uri="{BEBA8EAE-BF5A-486C-A8C5-ECC9F3942E4B}">
+                <a14:imgProps xmlns:a14="http://schemas.microsoft.com/office/drawing/2010/main">
+                  <a14:imgLayer r:embed="rId4">
+                    <a14:imgEffect>
+                      <a14:backgroundRemoval t="10000" b="90000" l="10000" r="90000">
+                        <a14:foregroundMark x1="31834" y1="39643" x2="37370" y2="38214"/>
+                        <a14:foregroundMark x1="37370" y1="38214" x2="34602" y2="43929"/>
+                        <a14:foregroundMark x1="34602" y1="43929" x2="36678" y2="56071"/>
+                        <a14:foregroundMark x1="53633" y1="44286" x2="55363" y2="38214"/>
+                        <a14:foregroundMark x1="55363" y1="38214" x2="49827" y2="35000"/>
+                        <a14:foregroundMark x1="49827" y1="35000" x2="45675" y2="39286"/>
+                        <a14:foregroundMark x1="45675" y1="39286" x2="47751" y2="44286"/>
+                        <a14:foregroundMark x1="47751" y1="44286" x2="49481" y2="45357"/>
+                        <a14:foregroundMark x1="63322" y1="46429" x2="69550" y2="46786"/>
+                      </a14:backgroundRemoval>
+                    </a14:imgEffect>
+                  </a14:imgLayer>
+                </a14:imgProps>
+              </a:ext>
+              <a:ext uri="{28A0092B-C50C-407E-A947-70E740481C1C}">
+                <a14:useLocalDpi xmlns:a14="http://schemas.microsoft.com/office/drawing/2010/main" val="0"/>
+              </a:ext>
+            </a:extLst>
+          </a:blip>
+          <a:srcRect/>
           <a:stretch>
             <a:fillRect/>
           </a:stretch>
         </p:blipFill>
-        <p:spPr>
+        <p:spPr bwMode="auto">
           <a:xfrm>
-            <a:off x="2667000" y="0"/>
-            <a:ext cx="6858000" cy="6858000"/>
+            <a:off x="1961334" y="-546100"/>
+            <a:ext cx="8900478" cy="8623300"/>
           </a:xfrm>
           <a:prstGeom prst="rect">
             <a:avLst/>
           </a:prstGeom>
+          <a:noFill/>
+          <a:extLst>
+            <a:ext uri="{909E8E84-426E-40DD-AFC4-6F175D3DCCD1}">
+              <a14:hiddenFill xmlns:a14="http://schemas.microsoft.com/office/drawing/2010/main">
+                <a:solidFill>
+                  <a:srgbClr val="FFFFFF"/>
+                </a:solidFill>
+              </a14:hiddenFill>
+            </a:ext>
+          </a:extLst>
         </p:spPr>
       </p:pic>
     </p:spTree>
@@ -16422,7 +16495,7 @@
                 <a:latin typeface="Arial" panose="020B0604020202020204" pitchFamily="34" charset="0"/>
                 <a:cs typeface="Arial" panose="020B0604020202020204" pitchFamily="34" charset="0"/>
               </a:rPr>
-              <a:t> Can social network messages be classified as violent or not? </a:t>
+              <a:t>Can social network messages be classified as violent or not? </a:t>
             </a:r>
           </a:p>
           <a:p>
@@ -16432,7 +16505,7 @@
                 <a:latin typeface="Arial" panose="020B0604020202020204" pitchFamily="34" charset="0"/>
                 <a:cs typeface="Arial" panose="020B0604020202020204" pitchFamily="34" charset="0"/>
               </a:rPr>
-              <a:t>What are the main causes of cyberbullying?</a:t>
+              <a:t>What are types of cyberbullying?</a:t>
             </a:r>
             <a:endParaRPr lang="he-IL" dirty="0">
               <a:latin typeface="Arial" panose="020B0604020202020204" pitchFamily="34" charset="0"/>

</xml_diff>